<commit_message>
Update presentation on news analysis using Python
</commit_message>
<xml_diff>
--- a/Hírek Elemzése Pythonnal.pptx
+++ b/Hírek Elemzése Pythonnal.pptx
@@ -5,7 +5,7 @@
     <p:sldMasterId id="2147483659" r:id="rId1"/>
   </p:sldMasterIdLst>
   <p:notesMasterIdLst>
-    <p:notesMasterId r:id="rId11"/>
+    <p:notesMasterId r:id="rId10"/>
   </p:notesMasterIdLst>
   <p:sldIdLst>
     <p:sldId id="256" r:id="rId2"/>
@@ -13,20 +13,19 @@
     <p:sldId id="258" r:id="rId4"/>
     <p:sldId id="259" r:id="rId5"/>
     <p:sldId id="260" r:id="rId6"/>
-    <p:sldId id="261" r:id="rId7"/>
-    <p:sldId id="262" r:id="rId8"/>
-    <p:sldId id="263" r:id="rId9"/>
-    <p:sldId id="264" r:id="rId10"/>
+    <p:sldId id="262" r:id="rId7"/>
+    <p:sldId id="263" r:id="rId8"/>
+    <p:sldId id="264" r:id="rId9"/>
   </p:sldIdLst>
   <p:sldSz cx="12192000" cy="6858000"/>
   <p:notesSz cx="6858000" cy="9144000"/>
   <p:embeddedFontLst>
     <p:embeddedFont>
       <p:font typeface="Urbanist" panose="020B0604020202020204" charset="-18"/>
-      <p:regular r:id="rId12"/>
-      <p:bold r:id="rId13"/>
-      <p:italic r:id="rId14"/>
-      <p:boldItalic r:id="rId15"/>
+      <p:regular r:id="rId11"/>
+      <p:bold r:id="rId12"/>
+      <p:italic r:id="rId13"/>
+      <p:boldItalic r:id="rId14"/>
     </p:embeddedFont>
   </p:embeddedFontLst>
   <p:defaultTextStyle>
@@ -889,8 +888,8 @@
         </p:nvSpPr>
         <p:spPr>
           <a:xfrm>
-            <a:off x="1143225" y="685800"/>
-            <a:ext cx="4572225" cy="3429000"/>
+            <a:off x="381000" y="685800"/>
+            <a:ext cx="6096000" cy="3429000"/>
           </a:xfrm>
           <a:custGeom>
             <a:avLst/>
@@ -1097,8 +1096,8 @@
         </p:nvSpPr>
         <p:spPr>
           <a:xfrm>
-            <a:off x="1143225" y="685800"/>
-            <a:ext cx="4572225" cy="3429000"/>
+            <a:off x="381000" y="685800"/>
+            <a:ext cx="6096000" cy="3429000"/>
           </a:xfrm>
           <a:custGeom>
             <a:avLst/>
@@ -1201,8 +1200,8 @@
         </p:nvSpPr>
         <p:spPr>
           <a:xfrm>
-            <a:off x="1143225" y="685800"/>
-            <a:ext cx="4572225" cy="3429000"/>
+            <a:off x="381000" y="685800"/>
+            <a:ext cx="6096000" cy="3429000"/>
           </a:xfrm>
           <a:custGeom>
             <a:avLst/>
@@ -1239,110 +1238,6 @@
 </file>
 
 <file path=ppt/notesSlides/notesSlide6.xml><?xml version="1.0" encoding="utf-8"?>
-<p:notes xmlns:a="http://schemas.openxmlformats.org/drawingml/2006/main" xmlns:r="http://schemas.openxmlformats.org/officeDocument/2006/relationships" xmlns:p="http://schemas.openxmlformats.org/presentationml/2006/main" showMasterSp="0" showMasterPhAnim="0">
-  <p:cSld>
-    <p:spTree>
-      <p:nvGrpSpPr>
-        <p:cNvPr id="1" name="Shape 161"/>
-        <p:cNvGrpSpPr/>
-        <p:nvPr/>
-      </p:nvGrpSpPr>
-      <p:grpSpPr>
-        <a:xfrm>
-          <a:off x="0" y="0"/>
-          <a:ext cx="0" cy="0"/>
-          <a:chOff x="0" y="0"/>
-          <a:chExt cx="0" cy="0"/>
-        </a:xfrm>
-      </p:grpSpPr>
-      <p:sp>
-        <p:nvSpPr>
-          <p:cNvPr id="162" name="Google Shape;162;p6:notes"/>
-          <p:cNvSpPr txBox="1">
-            <a:spLocks noGrp="1"/>
-          </p:cNvSpPr>
-          <p:nvPr>
-            <p:ph type="body" idx="1"/>
-          </p:nvPr>
-        </p:nvSpPr>
-        <p:spPr>
-          <a:xfrm>
-            <a:off x="685800" y="4343400"/>
-            <a:ext cx="5486400" cy="4114800"/>
-          </a:xfrm>
-          <a:prstGeom prst="rect">
-            <a:avLst/>
-          </a:prstGeom>
-        </p:spPr>
-        <p:txBody>
-          <a:bodyPr spcFirstLastPara="1" wrap="square" lIns="91425" tIns="91425" rIns="91425" bIns="91425" anchor="t" anchorCtr="0">
-            <a:noAutofit/>
-          </a:bodyPr>
-          <a:lstStyle/>
-          <a:p>
-            <a:pPr marL="0" lvl="0" indent="0" algn="l" rtl="0">
-              <a:spcBef>
-                <a:spcPts val="0"/>
-              </a:spcBef>
-              <a:spcAft>
-                <a:spcPts val="0"/>
-              </a:spcAft>
-              <a:buNone/>
-            </a:pPr>
-            <a:endParaRPr/>
-          </a:p>
-        </p:txBody>
-      </p:sp>
-      <p:sp>
-        <p:nvSpPr>
-          <p:cNvPr id="163" name="Google Shape;163;p6:notes"/>
-          <p:cNvSpPr>
-            <a:spLocks noGrp="1" noRot="1" noChangeAspect="1"/>
-          </p:cNvSpPr>
-          <p:nvPr>
-            <p:ph type="sldImg" idx="2"/>
-          </p:nvPr>
-        </p:nvSpPr>
-        <p:spPr>
-          <a:xfrm>
-            <a:off x="1143225" y="685800"/>
-            <a:ext cx="4572225" cy="3429000"/>
-          </a:xfrm>
-          <a:custGeom>
-            <a:avLst/>
-            <a:gdLst/>
-            <a:ahLst/>
-            <a:cxnLst/>
-            <a:rect l="l" t="t" r="r" b="b"/>
-            <a:pathLst>
-              <a:path w="120000" h="120000" extrusionOk="0">
-                <a:moveTo>
-                  <a:pt x="0" y="0"/>
-                </a:moveTo>
-                <a:lnTo>
-                  <a:pt x="120000" y="0"/>
-                </a:lnTo>
-                <a:lnTo>
-                  <a:pt x="120000" y="120000"/>
-                </a:lnTo>
-                <a:lnTo>
-                  <a:pt x="0" y="120000"/>
-                </a:lnTo>
-                <a:close/>
-              </a:path>
-            </a:pathLst>
-          </a:custGeom>
-        </p:spPr>
-      </p:sp>
-    </p:spTree>
-  </p:cSld>
-  <p:clrMapOvr>
-    <a:masterClrMapping/>
-  </p:clrMapOvr>
-</p:notes>
-</file>
-
-<file path=ppt/notesSlides/notesSlide7.xml><?xml version="1.0" encoding="utf-8"?>
 <p:notes xmlns:a="http://schemas.openxmlformats.org/drawingml/2006/main" xmlns:r="http://schemas.openxmlformats.org/officeDocument/2006/relationships" xmlns:p="http://schemas.openxmlformats.org/presentationml/2006/main" showMasterSp="0" showMasterPhAnim="0">
   <p:cSld>
     <p:spTree>
@@ -1409,8 +1304,8 @@
         </p:nvSpPr>
         <p:spPr>
           <a:xfrm>
-            <a:off x="1143225" y="685800"/>
-            <a:ext cx="4572225" cy="3429000"/>
+            <a:off x="381000" y="685800"/>
+            <a:ext cx="6096000" cy="3429000"/>
           </a:xfrm>
           <a:custGeom>
             <a:avLst/>
@@ -1446,7 +1341,7 @@
 </p:notes>
 </file>
 
-<file path=ppt/notesSlides/notesSlide8.xml><?xml version="1.0" encoding="utf-8"?>
+<file path=ppt/notesSlides/notesSlide7.xml><?xml version="1.0" encoding="utf-8"?>
 <p:notes xmlns:a="http://schemas.openxmlformats.org/drawingml/2006/main" xmlns:r="http://schemas.openxmlformats.org/officeDocument/2006/relationships" xmlns:p="http://schemas.openxmlformats.org/presentationml/2006/main" showMasterSp="0" showMasterPhAnim="0">
   <p:cSld>
     <p:spTree>
@@ -1550,7 +1445,7 @@
 </p:notes>
 </file>
 
-<file path=ppt/notesSlides/notesSlide9.xml><?xml version="1.0" encoding="utf-8"?>
+<file path=ppt/notesSlides/notesSlide8.xml><?xml version="1.0" encoding="utf-8"?>
 <p:notes xmlns:a="http://schemas.openxmlformats.org/drawingml/2006/main" xmlns:r="http://schemas.openxmlformats.org/officeDocument/2006/relationships" xmlns:p="http://schemas.openxmlformats.org/presentationml/2006/main" showMasterSp="0" showMasterPhAnim="0">
   <p:cSld>
     <p:spTree>
@@ -1617,8 +1512,8 @@
         </p:nvSpPr>
         <p:spPr>
           <a:xfrm>
-            <a:off x="1143225" y="685800"/>
-            <a:ext cx="4572225" cy="3429000"/>
+            <a:off x="381000" y="685800"/>
+            <a:ext cx="6096000" cy="3429000"/>
           </a:xfrm>
           <a:custGeom>
             <a:avLst/>
@@ -11567,7 +11462,7 @@
               <a:buNone/>
             </a:pPr>
             <a:r>
-              <a:rPr lang="en-US" sz="5400" b="1" i="0" u="none" strike="noStrike" cap="none">
+              <a:rPr lang="en-US" sz="5400" b="1" i="0" u="none" strike="noStrike" cap="none" dirty="0">
                 <a:solidFill>
                   <a:srgbClr val="F1F5F9"/>
                 </a:solidFill>
@@ -11576,10 +11471,46 @@
                 <a:cs typeface="Urbanist"/>
                 <a:sym typeface="Urbanist"/>
               </a:rPr>
-              <a:t>RSS Hírek Elemzése</a:t>
+              <a:t>RSS </a:t>
+            </a:r>
+            <a:r>
+              <a:rPr lang="en-US" sz="5400" b="1" i="0" u="none" strike="noStrike" cap="none" dirty="0" err="1">
+                <a:solidFill>
+                  <a:srgbClr val="F1F5F9"/>
+                </a:solidFill>
+                <a:latin typeface="Urbanist"/>
+                <a:ea typeface="Urbanist"/>
+                <a:cs typeface="Urbanist"/>
+                <a:sym typeface="Urbanist"/>
+              </a:rPr>
+              <a:t>Hírek</a:t>
+            </a:r>
+            <a:r>
+              <a:rPr lang="en-US" sz="5400" b="1" i="0" u="none" strike="noStrike" cap="none" dirty="0">
+                <a:solidFill>
+                  <a:srgbClr val="F1F5F9"/>
+                </a:solidFill>
+                <a:latin typeface="Urbanist"/>
+                <a:ea typeface="Urbanist"/>
+                <a:cs typeface="Urbanist"/>
+                <a:sym typeface="Urbanist"/>
+              </a:rPr>
+              <a:t> </a:t>
+            </a:r>
+            <a:r>
+              <a:rPr lang="en-US" sz="5400" b="1" i="0" u="none" strike="noStrike" cap="none" dirty="0" err="1">
+                <a:solidFill>
+                  <a:srgbClr val="F1F5F9"/>
+                </a:solidFill>
+                <a:latin typeface="Urbanist"/>
+                <a:ea typeface="Urbanist"/>
+                <a:cs typeface="Urbanist"/>
+                <a:sym typeface="Urbanist"/>
+              </a:rPr>
+              <a:t>Elemzése</a:t>
             </a:r>
             <a:br>
-              <a:rPr lang="en-US" sz="1800" b="0" i="0" u="none" strike="noStrike" cap="none">
+              <a:rPr lang="en-US" sz="1800" b="0" i="0" u="none" strike="noStrike" cap="none" dirty="0">
                 <a:solidFill>
                   <a:schemeClr val="dk1"/>
                 </a:solidFill>
@@ -11590,7 +11521,7 @@
               </a:rPr>
             </a:br>
             <a:r>
-              <a:rPr lang="en-US" sz="5400" b="1" i="0" u="none" strike="noStrike" cap="none">
+              <a:rPr lang="en-US" sz="5400" b="1" i="0" u="none" strike="noStrike" cap="none" dirty="0" err="1">
                 <a:solidFill>
                   <a:srgbClr val="3B82F6"/>
                 </a:solidFill>
@@ -11601,7 +11532,7 @@
               </a:rPr>
               <a:t>Pythonnal</a:t>
             </a:r>
-            <a:endParaRPr/>
+            <a:endParaRPr dirty="0"/>
           </a:p>
         </p:txBody>
       </p:sp>
@@ -11643,7 +11574,7 @@
               <a:buNone/>
             </a:pPr>
             <a:r>
-              <a:rPr lang="en-US" sz="2100" b="0" i="0" u="none" strike="noStrike" cap="none">
+              <a:rPr lang="en-US" sz="2100" b="0" i="0" u="none" strike="noStrike" cap="none" dirty="0" err="1">
                 <a:solidFill>
                   <a:srgbClr val="94A3B8"/>
                 </a:solidFill>
@@ -11652,9 +11583,81 @@
                 <a:cs typeface="Urbanist"/>
                 <a:sym typeface="Urbanist"/>
               </a:rPr>
-              <a:t>Automatikus adatgyűjtés és vizualizáció</a:t>
+              <a:t>Automatikus</a:t>
             </a:r>
-            <a:endParaRPr/>
+            <a:r>
+              <a:rPr lang="en-US" sz="2100" b="0" i="0" u="none" strike="noStrike" cap="none" dirty="0">
+                <a:solidFill>
+                  <a:srgbClr val="94A3B8"/>
+                </a:solidFill>
+                <a:latin typeface="Urbanist"/>
+                <a:ea typeface="Urbanist"/>
+                <a:cs typeface="Urbanist"/>
+                <a:sym typeface="Urbanist"/>
+              </a:rPr>
+              <a:t> </a:t>
+            </a:r>
+            <a:r>
+              <a:rPr lang="en-US" sz="2100" b="0" i="0" u="none" strike="noStrike" cap="none" dirty="0" err="1">
+                <a:solidFill>
+                  <a:srgbClr val="94A3B8"/>
+                </a:solidFill>
+                <a:latin typeface="Urbanist"/>
+                <a:ea typeface="Urbanist"/>
+                <a:cs typeface="Urbanist"/>
+                <a:sym typeface="Urbanist"/>
+              </a:rPr>
+              <a:t>adatgyűjtés</a:t>
+            </a:r>
+            <a:r>
+              <a:rPr lang="en-US" sz="2100" b="0" i="0" u="none" strike="noStrike" cap="none" dirty="0">
+                <a:solidFill>
+                  <a:srgbClr val="94A3B8"/>
+                </a:solidFill>
+                <a:latin typeface="Urbanist"/>
+                <a:ea typeface="Urbanist"/>
+                <a:cs typeface="Urbanist"/>
+                <a:sym typeface="Urbanist"/>
+              </a:rPr>
+              <a:t> </a:t>
+            </a:r>
+            <a:r>
+              <a:rPr lang="en-US" sz="2100" b="0" i="0" u="none" strike="noStrike" cap="none" dirty="0" err="1">
+                <a:solidFill>
+                  <a:srgbClr val="94A3B8"/>
+                </a:solidFill>
+                <a:latin typeface="Urbanist"/>
+                <a:ea typeface="Urbanist"/>
+                <a:cs typeface="Urbanist"/>
+                <a:sym typeface="Urbanist"/>
+              </a:rPr>
+              <a:t>és</a:t>
+            </a:r>
+            <a:r>
+              <a:rPr lang="en-US" sz="2100" b="0" i="0" u="none" strike="noStrike" cap="none" dirty="0">
+                <a:solidFill>
+                  <a:srgbClr val="94A3B8"/>
+                </a:solidFill>
+                <a:latin typeface="Urbanist"/>
+                <a:ea typeface="Urbanist"/>
+                <a:cs typeface="Urbanist"/>
+                <a:sym typeface="Urbanist"/>
+              </a:rPr>
+              <a:t> </a:t>
+            </a:r>
+            <a:r>
+              <a:rPr lang="en-US" sz="2100" b="0" i="0" u="none" strike="noStrike" cap="none" dirty="0" err="1">
+                <a:solidFill>
+                  <a:srgbClr val="94A3B8"/>
+                </a:solidFill>
+                <a:latin typeface="Urbanist"/>
+                <a:ea typeface="Urbanist"/>
+                <a:cs typeface="Urbanist"/>
+                <a:sym typeface="Urbanist"/>
+              </a:rPr>
+              <a:t>vizualizáció</a:t>
+            </a:r>
+            <a:endParaRPr dirty="0"/>
           </a:p>
         </p:txBody>
       </p:sp>
@@ -11992,7 +11995,7 @@
               <a:buNone/>
             </a:pPr>
             <a:r>
-              <a:rPr lang="en-US" sz="1500" b="1" i="0" u="none" strike="noStrike" cap="none">
+              <a:rPr lang="en-US" sz="1500" b="1" i="0" u="none" strike="noStrike" cap="none" dirty="0" err="1">
                 <a:solidFill>
                   <a:srgbClr val="CBD5E1"/>
                 </a:solidFill>
@@ -12001,10 +12004,10 @@
                 <a:cs typeface="Urbanist"/>
                 <a:sym typeface="Urbanist"/>
               </a:rPr>
-              <a:t>Megoldás:</a:t>
+              <a:t>Megoldás</a:t>
             </a:r>
             <a:r>
-              <a:rPr lang="en-US" sz="1500" b="0" i="0" u="none" strike="noStrike" cap="none">
+              <a:rPr lang="en-US" sz="1500" b="1" i="0" u="none" strike="noStrike" cap="none" dirty="0">
                 <a:solidFill>
                   <a:srgbClr val="CBD5E1"/>
                 </a:solidFill>
@@ -12013,9 +12016,117 @@
                 <a:cs typeface="Urbanist"/>
                 <a:sym typeface="Urbanist"/>
               </a:rPr>
-              <a:t> Egy Python program, ami automatikusan letölti a cikkeket.</a:t>
+              <a:t>:</a:t>
             </a:r>
-            <a:endParaRPr/>
+            <a:r>
+              <a:rPr lang="en-US" sz="1500" b="0" i="0" u="none" strike="noStrike" cap="none" dirty="0">
+                <a:solidFill>
+                  <a:srgbClr val="CBD5E1"/>
+                </a:solidFill>
+                <a:latin typeface="Urbanist"/>
+                <a:ea typeface="Urbanist"/>
+                <a:cs typeface="Urbanist"/>
+                <a:sym typeface="Urbanist"/>
+              </a:rPr>
+              <a:t> Egy Python program, </a:t>
+            </a:r>
+            <a:r>
+              <a:rPr lang="en-US" sz="1500" b="0" i="0" u="none" strike="noStrike" cap="none" dirty="0" err="1">
+                <a:solidFill>
+                  <a:srgbClr val="CBD5E1"/>
+                </a:solidFill>
+                <a:latin typeface="Urbanist"/>
+                <a:ea typeface="Urbanist"/>
+                <a:cs typeface="Urbanist"/>
+                <a:sym typeface="Urbanist"/>
+              </a:rPr>
+              <a:t>ami</a:t>
+            </a:r>
+            <a:r>
+              <a:rPr lang="en-US" sz="1500" b="0" i="0" u="none" strike="noStrike" cap="none" dirty="0">
+                <a:solidFill>
+                  <a:srgbClr val="CBD5E1"/>
+                </a:solidFill>
+                <a:latin typeface="Urbanist"/>
+                <a:ea typeface="Urbanist"/>
+                <a:cs typeface="Urbanist"/>
+                <a:sym typeface="Urbanist"/>
+              </a:rPr>
+              <a:t> </a:t>
+            </a:r>
+            <a:r>
+              <a:rPr lang="en-US" sz="1500" b="0" i="0" u="none" strike="noStrike" cap="none" dirty="0" err="1">
+                <a:solidFill>
+                  <a:srgbClr val="CBD5E1"/>
+                </a:solidFill>
+                <a:latin typeface="Urbanist"/>
+                <a:ea typeface="Urbanist"/>
+                <a:cs typeface="Urbanist"/>
+                <a:sym typeface="Urbanist"/>
+              </a:rPr>
+              <a:t>automatikusan</a:t>
+            </a:r>
+            <a:r>
+              <a:rPr lang="en-US" sz="1500" b="0" i="0" u="none" strike="noStrike" cap="none" dirty="0">
+                <a:solidFill>
+                  <a:srgbClr val="CBD5E1"/>
+                </a:solidFill>
+                <a:latin typeface="Urbanist"/>
+                <a:ea typeface="Urbanist"/>
+                <a:cs typeface="Urbanist"/>
+                <a:sym typeface="Urbanist"/>
+              </a:rPr>
+              <a:t> </a:t>
+            </a:r>
+            <a:r>
+              <a:rPr lang="en-US" sz="1500" b="0" i="0" u="none" strike="noStrike" cap="none" dirty="0" err="1">
+                <a:solidFill>
+                  <a:srgbClr val="CBD5E1"/>
+                </a:solidFill>
+                <a:latin typeface="Urbanist"/>
+                <a:ea typeface="Urbanist"/>
+                <a:cs typeface="Urbanist"/>
+                <a:sym typeface="Urbanist"/>
+              </a:rPr>
+              <a:t>letölti</a:t>
+            </a:r>
+            <a:r>
+              <a:rPr lang="en-US" sz="1500" b="0" i="0" u="none" strike="noStrike" cap="none" dirty="0">
+                <a:solidFill>
+                  <a:srgbClr val="CBD5E1"/>
+                </a:solidFill>
+                <a:latin typeface="Urbanist"/>
+                <a:ea typeface="Urbanist"/>
+                <a:cs typeface="Urbanist"/>
+                <a:sym typeface="Urbanist"/>
+              </a:rPr>
+              <a:t> a </a:t>
+            </a:r>
+            <a:r>
+              <a:rPr lang="en-US" sz="1500" b="0" i="0" u="none" strike="noStrike" cap="none" dirty="0" err="1">
+                <a:solidFill>
+                  <a:srgbClr val="CBD5E1"/>
+                </a:solidFill>
+                <a:latin typeface="Urbanist"/>
+                <a:ea typeface="Urbanist"/>
+                <a:cs typeface="Urbanist"/>
+                <a:sym typeface="Urbanist"/>
+              </a:rPr>
+              <a:t>cikkeket</a:t>
+            </a:r>
+            <a:r>
+              <a:rPr lang="en-US" sz="1500" b="0" i="0" u="none" strike="noStrike" cap="none" dirty="0">
+                <a:solidFill>
+                  <a:srgbClr val="CBD5E1"/>
+                </a:solidFill>
+                <a:latin typeface="Urbanist"/>
+                <a:ea typeface="Urbanist"/>
+                <a:cs typeface="Urbanist"/>
+                <a:sym typeface="Urbanist"/>
+              </a:rPr>
+              <a:t>.</a:t>
+            </a:r>
+            <a:endParaRPr dirty="0"/>
           </a:p>
         </p:txBody>
       </p:sp>
@@ -12028,7 +12139,7 @@
         <p:spPr>
           <a:xfrm>
             <a:off x="857250" y="4724400"/>
-            <a:ext cx="4953000" cy="304800"/>
+            <a:ext cx="4953000" cy="369332"/>
           </a:xfrm>
           <a:prstGeom prst="rect">
             <a:avLst/>
@@ -12057,7 +12168,7 @@
               <a:buNone/>
             </a:pPr>
             <a:r>
-              <a:rPr lang="en-US" sz="1500" b="1" i="0" u="none" strike="noStrike" cap="none">
+              <a:rPr lang="en-US" sz="1500" b="1" i="0" u="none" strike="noStrike" cap="none" dirty="0">
                 <a:solidFill>
                   <a:srgbClr val="CBD5E1"/>
                 </a:solidFill>
@@ -12069,7 +12180,7 @@
               <a:t>Extra:</a:t>
             </a:r>
             <a:r>
-              <a:rPr lang="en-US" sz="1500" b="0" i="0" u="none" strike="noStrike" cap="none">
+              <a:rPr lang="en-US" sz="1500" b="0" i="0" u="none" strike="noStrike" cap="none" dirty="0">
                 <a:solidFill>
                   <a:srgbClr val="CBD5E1"/>
                 </a:solidFill>
@@ -12078,9 +12189,81 @@
                 <a:cs typeface="Urbanist"/>
                 <a:sym typeface="Urbanist"/>
               </a:rPr>
-              <a:t> Mesterséges intelligenciával elemezzük a tartalmat.</a:t>
+              <a:t> </a:t>
             </a:r>
-            <a:endParaRPr/>
+            <a:r>
+              <a:rPr lang="hu-HU" sz="1500" b="0" i="0" u="none" strike="noStrike" cap="none" dirty="0">
+                <a:solidFill>
+                  <a:srgbClr val="CBD5E1"/>
+                </a:solidFill>
+                <a:latin typeface="Urbanist"/>
+                <a:ea typeface="Urbanist"/>
+                <a:cs typeface="Urbanist"/>
+                <a:sym typeface="Urbanist"/>
+              </a:rPr>
+              <a:t>Gépi tanulással</a:t>
+            </a:r>
+            <a:r>
+              <a:rPr lang="en-US" sz="1500" b="0" i="0" u="none" strike="noStrike" cap="none" dirty="0">
+                <a:solidFill>
+                  <a:srgbClr val="CBD5E1"/>
+                </a:solidFill>
+                <a:latin typeface="Urbanist"/>
+                <a:ea typeface="Urbanist"/>
+                <a:cs typeface="Urbanist"/>
+                <a:sym typeface="Urbanist"/>
+              </a:rPr>
+              <a:t> </a:t>
+            </a:r>
+            <a:r>
+              <a:rPr lang="en-US" sz="1500" b="0" i="0" u="none" strike="noStrike" cap="none" dirty="0" err="1">
+                <a:solidFill>
+                  <a:srgbClr val="CBD5E1"/>
+                </a:solidFill>
+                <a:latin typeface="Urbanist"/>
+                <a:ea typeface="Urbanist"/>
+                <a:cs typeface="Urbanist"/>
+                <a:sym typeface="Urbanist"/>
+              </a:rPr>
+              <a:t>elemezzük</a:t>
+            </a:r>
+            <a:r>
+              <a:rPr lang="en-US" sz="1500" b="0" i="0" u="none" strike="noStrike" cap="none" dirty="0">
+                <a:solidFill>
+                  <a:srgbClr val="CBD5E1"/>
+                </a:solidFill>
+                <a:latin typeface="Urbanist"/>
+                <a:ea typeface="Urbanist"/>
+                <a:cs typeface="Urbanist"/>
+                <a:sym typeface="Urbanist"/>
+              </a:rPr>
+              <a:t> a </a:t>
+            </a:r>
+            <a:r>
+              <a:rPr lang="en-US" sz="1500" b="0" i="0" u="none" strike="noStrike" cap="none" dirty="0" err="1">
+                <a:solidFill>
+                  <a:srgbClr val="CBD5E1"/>
+                </a:solidFill>
+                <a:latin typeface="Urbanist"/>
+                <a:ea typeface="Urbanist"/>
+                <a:cs typeface="Urbanist"/>
+                <a:sym typeface="Urbanist"/>
+              </a:rPr>
+              <a:t>tartalmat</a:t>
+            </a:r>
+            <a:r>
+              <a:rPr lang="en-US" sz="1500" b="0" i="0" u="none" strike="noStrike" cap="none" dirty="0">
+                <a:solidFill>
+                  <a:srgbClr val="CBD5E1"/>
+                </a:solidFill>
+                <a:latin typeface="Urbanist"/>
+                <a:ea typeface="Urbanist"/>
+                <a:cs typeface="Urbanist"/>
+                <a:sym typeface="Urbanist"/>
+              </a:rPr>
+              <a:t>.</a:t>
+            </a:r>
+            <a:endParaRPr dirty="0"/>
           </a:p>
         </p:txBody>
       </p:sp>
@@ -13002,33 +13185,6 @@
           </a:ln>
         </p:spPr>
       </p:pic>
-      <p:pic>
-        <p:nvPicPr>
-          <p:cNvPr id="129" name="Google Shape;129;p16" descr="image.png"/>
-          <p:cNvPicPr preferRelativeResize="0"/>
-          <p:nvPr/>
-        </p:nvPicPr>
-        <p:blipFill rotWithShape="1">
-          <a:blip r:embed="rId4">
-            <a:alphaModFix/>
-          </a:blip>
-          <a:srcRect/>
-          <a:stretch/>
-        </p:blipFill>
-        <p:spPr>
-          <a:xfrm>
-            <a:off x="6381750" y="2190750"/>
-            <a:ext cx="5238750" cy="3810000"/>
-          </a:xfrm>
-          <a:prstGeom prst="rect">
-            <a:avLst/>
-          </a:prstGeom>
-          <a:noFill/>
-          <a:ln>
-            <a:noFill/>
-          </a:ln>
-        </p:spPr>
-      </p:pic>
       <p:sp>
         <p:nvSpPr>
           <p:cNvPr id="130" name="Google Shape;130;p16"/>
@@ -13132,33 +13288,6 @@
           </a:p>
         </p:txBody>
       </p:sp>
-      <p:pic>
-        <p:nvPicPr>
-          <p:cNvPr id="132" name="Google Shape;132;p16" descr="image.png"/>
-          <p:cNvPicPr preferRelativeResize="0"/>
-          <p:nvPr/>
-        </p:nvPicPr>
-        <p:blipFill rotWithShape="1">
-          <a:blip r:embed="rId5">
-            <a:alphaModFix/>
-          </a:blip>
-          <a:srcRect/>
-          <a:stretch/>
-        </p:blipFill>
-        <p:spPr>
-          <a:xfrm>
-            <a:off x="6391275" y="2200275"/>
-            <a:ext cx="5219700" cy="3790950"/>
-          </a:xfrm>
-          <a:prstGeom prst="rect">
-            <a:avLst/>
-          </a:prstGeom>
-          <a:noFill/>
-          <a:ln>
-            <a:noFill/>
-          </a:ln>
-        </p:spPr>
-      </p:pic>
       <p:sp>
         <p:nvSpPr>
           <p:cNvPr id="133" name="Google Shape;133;p16"/>
@@ -13303,7 +13432,7 @@
               <a:buNone/>
             </a:pPr>
             <a:r>
-              <a:rPr lang="en-US" sz="1500" b="0" i="0" u="none" strike="noStrike" cap="none">
+              <a:rPr lang="en-US" sz="1500" b="0" i="0" u="none" strike="noStrike" cap="none" dirty="0" err="1">
                 <a:solidFill>
                   <a:srgbClr val="CBD5E1"/>
                 </a:solidFill>
@@ -13312,9 +13441,165 @@
                 <a:cs typeface="Urbanist"/>
                 <a:sym typeface="Urbanist"/>
               </a:rPr>
-              <a:t>Láthatóvá válik, melyik újság milyen témákra fókuszál.</a:t>
+              <a:t>Láthatóvá</a:t>
             </a:r>
-            <a:endParaRPr/>
+            <a:r>
+              <a:rPr lang="en-US" sz="1500" b="0" i="0" u="none" strike="noStrike" cap="none" dirty="0">
+                <a:solidFill>
+                  <a:srgbClr val="CBD5E1"/>
+                </a:solidFill>
+                <a:latin typeface="Urbanist"/>
+                <a:ea typeface="Urbanist"/>
+                <a:cs typeface="Urbanist"/>
+                <a:sym typeface="Urbanist"/>
+              </a:rPr>
+              <a:t> </a:t>
+            </a:r>
+            <a:r>
+              <a:rPr lang="en-US" sz="1500" b="0" i="0" u="none" strike="noStrike" cap="none" dirty="0" err="1">
+                <a:solidFill>
+                  <a:srgbClr val="CBD5E1"/>
+                </a:solidFill>
+                <a:latin typeface="Urbanist"/>
+                <a:ea typeface="Urbanist"/>
+                <a:cs typeface="Urbanist"/>
+                <a:sym typeface="Urbanist"/>
+              </a:rPr>
+              <a:t>válik</a:t>
+            </a:r>
+            <a:r>
+              <a:rPr lang="en-US" sz="1500" b="0" i="0" u="none" strike="noStrike" cap="none" dirty="0">
+                <a:solidFill>
+                  <a:srgbClr val="CBD5E1"/>
+                </a:solidFill>
+                <a:latin typeface="Urbanist"/>
+                <a:ea typeface="Urbanist"/>
+                <a:cs typeface="Urbanist"/>
+                <a:sym typeface="Urbanist"/>
+              </a:rPr>
+              <a:t>, </a:t>
+            </a:r>
+            <a:r>
+              <a:rPr lang="en-US" sz="1500" b="0" i="0" u="none" strike="noStrike" cap="none" dirty="0" err="1">
+                <a:solidFill>
+                  <a:srgbClr val="CBD5E1"/>
+                </a:solidFill>
+                <a:latin typeface="Urbanist"/>
+                <a:ea typeface="Urbanist"/>
+                <a:cs typeface="Urbanist"/>
+                <a:sym typeface="Urbanist"/>
+              </a:rPr>
+              <a:t>melyik</a:t>
+            </a:r>
+            <a:r>
+              <a:rPr lang="en-US" sz="1500" b="0" i="0" u="none" strike="noStrike" cap="none" dirty="0">
+                <a:solidFill>
+                  <a:srgbClr val="CBD5E1"/>
+                </a:solidFill>
+                <a:latin typeface="Urbanist"/>
+                <a:ea typeface="Urbanist"/>
+                <a:cs typeface="Urbanist"/>
+                <a:sym typeface="Urbanist"/>
+              </a:rPr>
+              <a:t> </a:t>
+            </a:r>
+            <a:r>
+              <a:rPr lang="en-US" sz="1500" b="0" i="0" u="none" strike="noStrike" cap="none" dirty="0" err="1">
+                <a:solidFill>
+                  <a:srgbClr val="CBD5E1"/>
+                </a:solidFill>
+                <a:latin typeface="Urbanist"/>
+                <a:ea typeface="Urbanist"/>
+                <a:cs typeface="Urbanist"/>
+                <a:sym typeface="Urbanist"/>
+              </a:rPr>
+              <a:t>újság</a:t>
+            </a:r>
+            <a:r>
+              <a:rPr lang="en-US" sz="1500" b="0" i="0" u="none" strike="noStrike" cap="none" dirty="0">
+                <a:solidFill>
+                  <a:srgbClr val="CBD5E1"/>
+                </a:solidFill>
+                <a:latin typeface="Urbanist"/>
+                <a:ea typeface="Urbanist"/>
+                <a:cs typeface="Urbanist"/>
+                <a:sym typeface="Urbanist"/>
+              </a:rPr>
+              <a:t> </a:t>
+            </a:r>
+            <a:r>
+              <a:rPr lang="en-US" sz="1500" b="0" i="0" u="none" strike="noStrike" cap="none" dirty="0" err="1">
+                <a:solidFill>
+                  <a:srgbClr val="CBD5E1"/>
+                </a:solidFill>
+                <a:latin typeface="Urbanist"/>
+                <a:ea typeface="Urbanist"/>
+                <a:cs typeface="Urbanist"/>
+                <a:sym typeface="Urbanist"/>
+              </a:rPr>
+              <a:t>milyen</a:t>
+            </a:r>
+            <a:r>
+              <a:rPr lang="en-US" sz="1500" b="0" i="0" u="none" strike="noStrike" cap="none" dirty="0">
+                <a:solidFill>
+                  <a:srgbClr val="CBD5E1"/>
+                </a:solidFill>
+                <a:latin typeface="Urbanist"/>
+                <a:ea typeface="Urbanist"/>
+                <a:cs typeface="Urbanist"/>
+                <a:sym typeface="Urbanist"/>
+              </a:rPr>
+              <a:t> </a:t>
+            </a:r>
+            <a:r>
+              <a:rPr lang="en-US" sz="1500" b="0" i="0" u="none" strike="noStrike" cap="none" dirty="0" err="1">
+                <a:solidFill>
+                  <a:srgbClr val="CBD5E1"/>
+                </a:solidFill>
+                <a:latin typeface="Urbanist"/>
+                <a:ea typeface="Urbanist"/>
+                <a:cs typeface="Urbanist"/>
+                <a:sym typeface="Urbanist"/>
+              </a:rPr>
+              <a:t>témákra</a:t>
+            </a:r>
+            <a:r>
+              <a:rPr lang="en-US" sz="1500" b="0" i="0" u="none" strike="noStrike" cap="none" dirty="0">
+                <a:solidFill>
+                  <a:srgbClr val="CBD5E1"/>
+                </a:solidFill>
+                <a:latin typeface="Urbanist"/>
+                <a:ea typeface="Urbanist"/>
+                <a:cs typeface="Urbanist"/>
+                <a:sym typeface="Urbanist"/>
+              </a:rPr>
+              <a:t> </a:t>
+            </a:r>
+            <a:r>
+              <a:rPr lang="en-US" sz="1500" b="0" i="0" u="none" strike="noStrike" cap="none" dirty="0" err="1">
+                <a:solidFill>
+                  <a:srgbClr val="CBD5E1"/>
+                </a:solidFill>
+                <a:latin typeface="Urbanist"/>
+                <a:ea typeface="Urbanist"/>
+                <a:cs typeface="Urbanist"/>
+                <a:sym typeface="Urbanist"/>
+              </a:rPr>
+              <a:t>fókuszál</a:t>
+            </a:r>
+            <a:r>
+              <a:rPr lang="en-US" sz="1500" b="0" i="0" u="none" strike="noStrike" cap="none" dirty="0">
+                <a:solidFill>
+                  <a:srgbClr val="CBD5E1"/>
+                </a:solidFill>
+                <a:latin typeface="Urbanist"/>
+                <a:ea typeface="Urbanist"/>
+                <a:cs typeface="Urbanist"/>
+                <a:sym typeface="Urbanist"/>
+              </a:rPr>
+              <a:t>.</a:t>
+            </a:r>
+            <a:endParaRPr dirty="0"/>
           </a:p>
         </p:txBody>
       </p:sp>
@@ -13423,7 +13708,7 @@
           <p:nvPr/>
         </p:nvPicPr>
         <p:blipFill rotWithShape="1">
-          <a:blip r:embed="rId6">
+          <a:blip r:embed="rId4">
             <a:alphaModFix/>
           </a:blip>
           <a:srcRect/>
@@ -13450,7 +13735,7 @@
           <p:nvPr/>
         </p:nvPicPr>
         <p:blipFill rotWithShape="1">
-          <a:blip r:embed="rId6">
+          <a:blip r:embed="rId4">
             <a:alphaModFix/>
           </a:blip>
           <a:srcRect/>
@@ -13477,7 +13762,7 @@
           <p:nvPr/>
         </p:nvPicPr>
         <p:blipFill rotWithShape="1">
-          <a:blip r:embed="rId6">
+          <a:blip r:embed="rId4">
             <a:alphaModFix/>
           </a:blip>
           <a:srcRect/>
@@ -13495,6 +13780,36 @@
           <a:ln>
             <a:noFill/>
           </a:ln>
+        </p:spPr>
+      </p:pic>
+      <p:pic>
+        <p:nvPicPr>
+          <p:cNvPr id="3" name="Kép 2">
+            <a:extLst>
+              <a:ext uri="{FF2B5EF4-FFF2-40B4-BE49-F238E27FC236}">
+                <a16:creationId xmlns:a16="http://schemas.microsoft.com/office/drawing/2014/main" id="{BD677233-B804-B69A-817A-AF0BDA0DA3D8}"/>
+              </a:ext>
+            </a:extLst>
+          </p:cNvPr>
+          <p:cNvPicPr>
+            <a:picLocks noChangeAspect="1"/>
+          </p:cNvPicPr>
+          <p:nvPr/>
+        </p:nvPicPr>
+        <p:blipFill>
+          <a:blip r:embed="rId5"/>
+          <a:stretch>
+            <a:fillRect/>
+          </a:stretch>
+        </p:blipFill>
+        <p:spPr>
+          <a:xfrm>
+            <a:off x="5905500" y="2561844"/>
+            <a:ext cx="5896798" cy="2724530"/>
+          </a:xfrm>
+          <a:prstGeom prst="rect">
+            <a:avLst/>
+          </a:prstGeom>
         </p:spPr>
       </p:pic>
     </p:spTree>
@@ -13676,7 +13991,7 @@
               <a:buNone/>
             </a:pPr>
             <a:r>
-              <a:rPr lang="en-US" sz="1500" b="0" i="0" u="none" strike="noStrike" cap="none">
+              <a:rPr lang="en-US" sz="1500" b="0" i="0" u="none" strike="noStrike" cap="none" dirty="0" err="1">
                 <a:solidFill>
                   <a:srgbClr val="CBD5E1"/>
                 </a:solidFill>
@@ -13685,9 +14000,189 @@
                 <a:cs typeface="Urbanist"/>
                 <a:sym typeface="Urbanist"/>
               </a:rPr>
-              <a:t>Összehasonlítottunk több algoritmust, hogy melyik a leggyorsabb a cikkek rendszerezésében.</a:t>
+              <a:t>Összehasonlítottunk</a:t>
             </a:r>
-            <a:endParaRPr/>
+            <a:r>
+              <a:rPr lang="en-US" sz="1500" b="0" i="0" u="none" strike="noStrike" cap="none" dirty="0">
+                <a:solidFill>
+                  <a:srgbClr val="CBD5E1"/>
+                </a:solidFill>
+                <a:latin typeface="Urbanist"/>
+                <a:ea typeface="Urbanist"/>
+                <a:cs typeface="Urbanist"/>
+                <a:sym typeface="Urbanist"/>
+              </a:rPr>
+              <a:t> </a:t>
+            </a:r>
+            <a:r>
+              <a:rPr lang="en-US" sz="1500" b="0" i="0" u="none" strike="noStrike" cap="none" dirty="0" err="1">
+                <a:solidFill>
+                  <a:srgbClr val="CBD5E1"/>
+                </a:solidFill>
+                <a:latin typeface="Urbanist"/>
+                <a:ea typeface="Urbanist"/>
+                <a:cs typeface="Urbanist"/>
+                <a:sym typeface="Urbanist"/>
+              </a:rPr>
+              <a:t>több</a:t>
+            </a:r>
+            <a:r>
+              <a:rPr lang="en-US" sz="1500" b="0" i="0" u="none" strike="noStrike" cap="none" dirty="0">
+                <a:solidFill>
+                  <a:srgbClr val="CBD5E1"/>
+                </a:solidFill>
+                <a:latin typeface="Urbanist"/>
+                <a:ea typeface="Urbanist"/>
+                <a:cs typeface="Urbanist"/>
+                <a:sym typeface="Urbanist"/>
+              </a:rPr>
+              <a:t> </a:t>
+            </a:r>
+            <a:r>
+              <a:rPr lang="en-US" sz="1500" b="0" i="0" u="none" strike="noStrike" cap="none" dirty="0" err="1">
+                <a:solidFill>
+                  <a:srgbClr val="CBD5E1"/>
+                </a:solidFill>
+                <a:latin typeface="Urbanist"/>
+                <a:ea typeface="Urbanist"/>
+                <a:cs typeface="Urbanist"/>
+                <a:sym typeface="Urbanist"/>
+              </a:rPr>
+              <a:t>algoritmust</a:t>
+            </a:r>
+            <a:r>
+              <a:rPr lang="en-US" sz="1500" b="0" i="0" u="none" strike="noStrike" cap="none" dirty="0">
+                <a:solidFill>
+                  <a:srgbClr val="CBD5E1"/>
+                </a:solidFill>
+                <a:latin typeface="Urbanist"/>
+                <a:ea typeface="Urbanist"/>
+                <a:cs typeface="Urbanist"/>
+                <a:sym typeface="Urbanist"/>
+              </a:rPr>
+              <a:t>, </a:t>
+            </a:r>
+            <a:r>
+              <a:rPr lang="en-US" sz="1500" b="0" i="0" u="none" strike="noStrike" cap="none" dirty="0" err="1">
+                <a:solidFill>
+                  <a:srgbClr val="CBD5E1"/>
+                </a:solidFill>
+                <a:latin typeface="Urbanist"/>
+                <a:ea typeface="Urbanist"/>
+                <a:cs typeface="Urbanist"/>
+                <a:sym typeface="Urbanist"/>
+              </a:rPr>
+              <a:t>hogy</a:t>
+            </a:r>
+            <a:r>
+              <a:rPr lang="en-US" sz="1500" b="0" i="0" u="none" strike="noStrike" cap="none" dirty="0">
+                <a:solidFill>
+                  <a:srgbClr val="CBD5E1"/>
+                </a:solidFill>
+                <a:latin typeface="Urbanist"/>
+                <a:ea typeface="Urbanist"/>
+                <a:cs typeface="Urbanist"/>
+                <a:sym typeface="Urbanist"/>
+              </a:rPr>
+              <a:t> </a:t>
+            </a:r>
+            <a:r>
+              <a:rPr lang="en-US" sz="1500" b="0" i="0" u="none" strike="noStrike" cap="none" dirty="0" err="1">
+                <a:solidFill>
+                  <a:srgbClr val="CBD5E1"/>
+                </a:solidFill>
+                <a:latin typeface="Urbanist"/>
+                <a:ea typeface="Urbanist"/>
+                <a:cs typeface="Urbanist"/>
+                <a:sym typeface="Urbanist"/>
+              </a:rPr>
+              <a:t>melyik</a:t>
+            </a:r>
+            <a:r>
+              <a:rPr lang="en-US" sz="1500" b="0" i="0" u="none" strike="noStrike" cap="none" dirty="0">
+                <a:solidFill>
+                  <a:srgbClr val="CBD5E1"/>
+                </a:solidFill>
+                <a:latin typeface="Urbanist"/>
+                <a:ea typeface="Urbanist"/>
+                <a:cs typeface="Urbanist"/>
+                <a:sym typeface="Urbanist"/>
+              </a:rPr>
+              <a:t> a </a:t>
+            </a:r>
+            <a:r>
+              <a:rPr lang="en-US" sz="1500" b="0" i="0" u="none" strike="noStrike" cap="none" dirty="0" err="1">
+                <a:solidFill>
+                  <a:srgbClr val="CBD5E1"/>
+                </a:solidFill>
+                <a:latin typeface="Urbanist"/>
+                <a:ea typeface="Urbanist"/>
+                <a:cs typeface="Urbanist"/>
+                <a:sym typeface="Urbanist"/>
+              </a:rPr>
+              <a:t>leggyorsabb</a:t>
+            </a:r>
+            <a:r>
+              <a:rPr lang="en-US" sz="1500" b="0" i="0" u="none" strike="noStrike" cap="none" dirty="0">
+                <a:solidFill>
+                  <a:srgbClr val="CBD5E1"/>
+                </a:solidFill>
+                <a:latin typeface="Urbanist"/>
+                <a:ea typeface="Urbanist"/>
+                <a:cs typeface="Urbanist"/>
+                <a:sym typeface="Urbanist"/>
+              </a:rPr>
+              <a:t> a </a:t>
+            </a:r>
+            <a:r>
+              <a:rPr lang="en-US" sz="1500" b="0" i="0" u="none" strike="noStrike" cap="none" dirty="0" err="1">
+                <a:solidFill>
+                  <a:srgbClr val="CBD5E1"/>
+                </a:solidFill>
+                <a:latin typeface="Urbanist"/>
+                <a:ea typeface="Urbanist"/>
+                <a:cs typeface="Urbanist"/>
+                <a:sym typeface="Urbanist"/>
+              </a:rPr>
+              <a:t>cikkek</a:t>
+            </a:r>
+            <a:r>
+              <a:rPr lang="en-US" sz="1500" b="0" i="0" u="none" strike="noStrike" cap="none" dirty="0">
+                <a:solidFill>
+                  <a:srgbClr val="CBD5E1"/>
+                </a:solidFill>
+                <a:latin typeface="Urbanist"/>
+                <a:ea typeface="Urbanist"/>
+                <a:cs typeface="Urbanist"/>
+                <a:sym typeface="Urbanist"/>
+              </a:rPr>
+              <a:t> </a:t>
+            </a:r>
+            <a:r>
+              <a:rPr lang="en-US" sz="1500" b="0" i="0" u="none" strike="noStrike" cap="none" dirty="0" err="1">
+                <a:solidFill>
+                  <a:srgbClr val="CBD5E1"/>
+                </a:solidFill>
+                <a:latin typeface="Urbanist"/>
+                <a:ea typeface="Urbanist"/>
+                <a:cs typeface="Urbanist"/>
+                <a:sym typeface="Urbanist"/>
+              </a:rPr>
+              <a:t>rendszerezésében</a:t>
+            </a:r>
+            <a:r>
+              <a:rPr lang="en-US" sz="1500" b="0" i="0" u="none" strike="noStrike" cap="none" dirty="0">
+                <a:solidFill>
+                  <a:srgbClr val="CBD5E1"/>
+                </a:solidFill>
+                <a:latin typeface="Urbanist"/>
+                <a:ea typeface="Urbanist"/>
+                <a:cs typeface="Urbanist"/>
+                <a:sym typeface="Urbanist"/>
+              </a:rPr>
+              <a:t>.</a:t>
+            </a:r>
+            <a:endParaRPr dirty="0"/>
           </a:p>
         </p:txBody>
       </p:sp>
@@ -13779,7 +14274,7 @@
               <a:buNone/>
             </a:pPr>
             <a:r>
-              <a:rPr lang="en-US" sz="1350" b="0" i="0" u="none" strike="noStrike" cap="none">
+              <a:rPr lang="en-US" sz="1350" b="0" i="0" u="none" strike="noStrike" cap="none" dirty="0" err="1">
                 <a:solidFill>
                   <a:srgbClr val="94A3B8"/>
                 </a:solidFill>
@@ -13788,9 +14283,69 @@
                 <a:cs typeface="Urbanist"/>
                 <a:sym typeface="Urbanist"/>
               </a:rPr>
-              <a:t>Döntési fa alapú osztályozás.</a:t>
+              <a:t>Döntési</a:t>
             </a:r>
-            <a:endParaRPr/>
+            <a:r>
+              <a:rPr lang="en-US" sz="1350" b="0" i="0" u="none" strike="noStrike" cap="none" dirty="0">
+                <a:solidFill>
+                  <a:srgbClr val="94A3B8"/>
+                </a:solidFill>
+                <a:latin typeface="Urbanist"/>
+                <a:ea typeface="Urbanist"/>
+                <a:cs typeface="Urbanist"/>
+                <a:sym typeface="Urbanist"/>
+              </a:rPr>
+              <a:t> fa </a:t>
+            </a:r>
+            <a:r>
+              <a:rPr lang="en-US" sz="1350" b="0" i="0" u="none" strike="noStrike" cap="none" dirty="0" err="1">
+                <a:solidFill>
+                  <a:srgbClr val="94A3B8"/>
+                </a:solidFill>
+                <a:latin typeface="Urbanist"/>
+                <a:ea typeface="Urbanist"/>
+                <a:cs typeface="Urbanist"/>
+                <a:sym typeface="Urbanist"/>
+              </a:rPr>
+              <a:t>alapú</a:t>
+            </a:r>
+            <a:r>
+              <a:rPr lang="en-US" sz="1350" b="0" i="0" u="none" strike="noStrike" cap="none" dirty="0">
+                <a:solidFill>
+                  <a:srgbClr val="94A3B8"/>
+                </a:solidFill>
+                <a:latin typeface="Urbanist"/>
+                <a:ea typeface="Urbanist"/>
+                <a:cs typeface="Urbanist"/>
+                <a:sym typeface="Urbanist"/>
+              </a:rPr>
+              <a:t> </a:t>
+            </a:r>
+            <a:r>
+              <a:rPr lang="en-US" sz="1350" b="0" i="0" u="none" strike="noStrike" cap="none" dirty="0" err="1">
+                <a:solidFill>
+                  <a:srgbClr val="94A3B8"/>
+                </a:solidFill>
+                <a:latin typeface="Urbanist"/>
+                <a:ea typeface="Urbanist"/>
+                <a:cs typeface="Urbanist"/>
+                <a:sym typeface="Urbanist"/>
+              </a:rPr>
+              <a:t>osztályozás</a:t>
+            </a:r>
+            <a:r>
+              <a:rPr lang="en-US" sz="1350" b="0" i="0" u="none" strike="noStrike" cap="none" dirty="0">
+                <a:solidFill>
+                  <a:srgbClr val="94A3B8"/>
+                </a:solidFill>
+                <a:latin typeface="Urbanist"/>
+                <a:ea typeface="Urbanist"/>
+                <a:cs typeface="Urbanist"/>
+                <a:sym typeface="Urbanist"/>
+              </a:rPr>
+              <a:t>.</a:t>
+            </a:r>
+            <a:endParaRPr dirty="0"/>
           </a:p>
         </p:txBody>
       </p:sp>
@@ -13882,7 +14437,7 @@
               <a:buNone/>
             </a:pPr>
             <a:r>
-              <a:rPr lang="en-US" sz="1350" b="0" i="0" u="none" strike="noStrike" cap="none">
+              <a:rPr lang="en-US" sz="1350" b="0" i="0" u="none" strike="noStrike" cap="none" dirty="0" err="1">
                 <a:solidFill>
                   <a:srgbClr val="94A3B8"/>
                 </a:solidFill>
@@ -13891,9 +14446,93 @@
                 <a:cs typeface="Urbanist"/>
                 <a:sym typeface="Urbanist"/>
               </a:rPr>
-              <a:t>Csoportosítás (klaszterezés) felügyelet nélkül.</a:t>
+              <a:t>Csoportosítás</a:t>
             </a:r>
-            <a:endParaRPr/>
+            <a:r>
+              <a:rPr lang="en-US" sz="1350" b="0" i="0" u="none" strike="noStrike" cap="none" dirty="0">
+                <a:solidFill>
+                  <a:srgbClr val="94A3B8"/>
+                </a:solidFill>
+                <a:latin typeface="Urbanist"/>
+                <a:ea typeface="Urbanist"/>
+                <a:cs typeface="Urbanist"/>
+                <a:sym typeface="Urbanist"/>
+              </a:rPr>
+              <a:t> (</a:t>
+            </a:r>
+            <a:r>
+              <a:rPr lang="en-US" sz="1350" b="0" i="0" u="none" strike="noStrike" cap="none" dirty="0" err="1">
+                <a:solidFill>
+                  <a:srgbClr val="94A3B8"/>
+                </a:solidFill>
+                <a:latin typeface="Urbanist"/>
+                <a:ea typeface="Urbanist"/>
+                <a:cs typeface="Urbanist"/>
+                <a:sym typeface="Urbanist"/>
+              </a:rPr>
+              <a:t>klaszterezés</a:t>
+            </a:r>
+            <a:r>
+              <a:rPr lang="en-US" sz="1350" b="0" i="0" u="none" strike="noStrike" cap="none" dirty="0">
+                <a:solidFill>
+                  <a:srgbClr val="94A3B8"/>
+                </a:solidFill>
+                <a:latin typeface="Urbanist"/>
+                <a:ea typeface="Urbanist"/>
+                <a:cs typeface="Urbanist"/>
+                <a:sym typeface="Urbanist"/>
+              </a:rPr>
+              <a:t>) </a:t>
+            </a:r>
+            <a:r>
+              <a:rPr lang="en-US" sz="1350" b="0" i="0" u="none" strike="noStrike" cap="none" dirty="0" err="1">
+                <a:solidFill>
+                  <a:srgbClr val="94A3B8"/>
+                </a:solidFill>
+                <a:latin typeface="Urbanist"/>
+                <a:ea typeface="Urbanist"/>
+                <a:cs typeface="Urbanist"/>
+                <a:sym typeface="Urbanist"/>
+              </a:rPr>
+              <a:t>felügyelet</a:t>
+            </a:r>
+            <a:r>
+              <a:rPr lang="en-US" sz="1350" b="0" i="0" u="none" strike="noStrike" cap="none" dirty="0">
+                <a:solidFill>
+                  <a:srgbClr val="94A3B8"/>
+                </a:solidFill>
+                <a:latin typeface="Urbanist"/>
+                <a:ea typeface="Urbanist"/>
+                <a:cs typeface="Urbanist"/>
+                <a:sym typeface="Urbanist"/>
+              </a:rPr>
+              <a:t> </a:t>
+            </a:r>
+            <a:r>
+              <a:rPr lang="en-US" sz="1350" b="0" i="0" u="none" strike="noStrike" cap="none" dirty="0" err="1">
+                <a:solidFill>
+                  <a:srgbClr val="94A3B8"/>
+                </a:solidFill>
+                <a:latin typeface="Urbanist"/>
+                <a:ea typeface="Urbanist"/>
+                <a:cs typeface="Urbanist"/>
+                <a:sym typeface="Urbanist"/>
+              </a:rPr>
+              <a:t>nélkül</a:t>
+            </a:r>
+            <a:r>
+              <a:rPr lang="en-US" sz="1350" b="0" i="0" u="none" strike="noStrike" cap="none" dirty="0">
+                <a:solidFill>
+                  <a:srgbClr val="94A3B8"/>
+                </a:solidFill>
+                <a:latin typeface="Urbanist"/>
+                <a:ea typeface="Urbanist"/>
+                <a:cs typeface="Urbanist"/>
+                <a:sym typeface="Urbanist"/>
+              </a:rPr>
+              <a:t>.</a:t>
+            </a:r>
+            <a:endParaRPr dirty="0"/>
           </a:p>
         </p:txBody>
       </p:sp>
@@ -14116,7 +14755,7 @@
               <a:buNone/>
             </a:pPr>
             <a:r>
-              <a:rPr lang="en-US" sz="3600" b="1" i="0" u="none" strike="noStrike" cap="none">
+              <a:rPr lang="en-US" sz="3600" b="1" i="0" u="none" strike="noStrike" cap="none" dirty="0" err="1">
                 <a:solidFill>
                   <a:srgbClr val="F1F5F9"/>
                 </a:solidFill>
@@ -14125,9 +14764,33 @@
                 <a:cs typeface="Urbanist"/>
                 <a:sym typeface="Urbanist"/>
               </a:rPr>
-              <a:t>Gépi Tanulás (AI)</a:t>
+              <a:t>Gépi</a:t>
             </a:r>
-            <a:endParaRPr/>
+            <a:r>
+              <a:rPr lang="en-US" sz="3600" b="1" i="0" u="none" strike="noStrike" cap="none" dirty="0">
+                <a:solidFill>
+                  <a:srgbClr val="F1F5F9"/>
+                </a:solidFill>
+                <a:latin typeface="Urbanist"/>
+                <a:ea typeface="Urbanist"/>
+                <a:cs typeface="Urbanist"/>
+                <a:sym typeface="Urbanist"/>
+              </a:rPr>
+              <a:t> </a:t>
+            </a:r>
+            <a:r>
+              <a:rPr lang="en-US" sz="3600" b="1" i="0" u="none" strike="noStrike" cap="none" dirty="0" err="1">
+                <a:solidFill>
+                  <a:srgbClr val="F1F5F9"/>
+                </a:solidFill>
+                <a:latin typeface="Urbanist"/>
+                <a:ea typeface="Urbanist"/>
+                <a:cs typeface="Urbanist"/>
+                <a:sym typeface="Urbanist"/>
+              </a:rPr>
+              <a:t>Tanulás</a:t>
+            </a:r>
+            <a:endParaRPr dirty="0"/>
           </a:p>
         </p:txBody>
       </p:sp>
@@ -14188,561 +14851,6 @@
 </file>
 
 <file path=ppt/slides/slide6.xml><?xml version="1.0" encoding="utf-8"?>
-<p:sld xmlns:a="http://schemas.openxmlformats.org/drawingml/2006/main" xmlns:r="http://schemas.openxmlformats.org/officeDocument/2006/relationships" xmlns:p="http://schemas.openxmlformats.org/presentationml/2006/main">
-  <p:cSld>
-    <p:bg>
-      <p:bgPr>
-        <a:solidFill>
-          <a:srgbClr val="0F172A"/>
-        </a:solidFill>
-        <a:effectLst/>
-      </p:bgPr>
-    </p:bg>
-    <p:spTree>
-      <p:nvGrpSpPr>
-        <p:cNvPr id="1" name="Shape 164"/>
-        <p:cNvGrpSpPr/>
-        <p:nvPr/>
-      </p:nvGrpSpPr>
-      <p:grpSpPr>
-        <a:xfrm>
-          <a:off x="0" y="0"/>
-          <a:ext cx="0" cy="0"/>
-          <a:chOff x="0" y="0"/>
-          <a:chExt cx="0" cy="0"/>
-        </a:xfrm>
-      </p:grpSpPr>
-      <p:pic>
-        <p:nvPicPr>
-          <p:cNvPr id="165" name="Google Shape;165;p18" descr="image.png"/>
-          <p:cNvPicPr preferRelativeResize="0"/>
-          <p:nvPr/>
-        </p:nvPicPr>
-        <p:blipFill rotWithShape="1">
-          <a:blip r:embed="rId3">
-            <a:alphaModFix/>
-          </a:blip>
-          <a:srcRect/>
-          <a:stretch/>
-        </p:blipFill>
-        <p:spPr>
-          <a:xfrm>
-            <a:off x="0" y="0"/>
-            <a:ext cx="12192000" cy="6858000"/>
-          </a:xfrm>
-          <a:prstGeom prst="rect">
-            <a:avLst/>
-          </a:prstGeom>
-          <a:noFill/>
-          <a:ln>
-            <a:noFill/>
-          </a:ln>
-        </p:spPr>
-      </p:pic>
-      <p:pic>
-        <p:nvPicPr>
-          <p:cNvPr id="166" name="Google Shape;166;p18" descr="image.png"/>
-          <p:cNvPicPr preferRelativeResize="0"/>
-          <p:nvPr/>
-        </p:nvPicPr>
-        <p:blipFill rotWithShape="1">
-          <a:blip r:embed="rId4">
-            <a:alphaModFix/>
-          </a:blip>
-          <a:srcRect/>
-          <a:stretch/>
-        </p:blipFill>
-        <p:spPr>
-          <a:xfrm>
-            <a:off x="6381750" y="2190750"/>
-            <a:ext cx="5238750" cy="3810000"/>
-          </a:xfrm>
-          <a:prstGeom prst="rect">
-            <a:avLst/>
-          </a:prstGeom>
-          <a:noFill/>
-          <a:ln>
-            <a:noFill/>
-          </a:ln>
-        </p:spPr>
-      </p:pic>
-      <p:sp>
-        <p:nvSpPr>
-          <p:cNvPr id="167" name="Google Shape;167;p18"/>
-          <p:cNvSpPr txBox="1"/>
-          <p:nvPr/>
-        </p:nvSpPr>
-        <p:spPr>
-          <a:xfrm>
-            <a:off x="571500" y="2438400"/>
-            <a:ext cx="5500687" cy="219075"/>
-          </a:xfrm>
-          <a:prstGeom prst="rect">
-            <a:avLst/>
-          </a:prstGeom>
-          <a:noFill/>
-          <a:ln>
-            <a:noFill/>
-          </a:ln>
-        </p:spPr>
-        <p:txBody>
-          <a:bodyPr spcFirstLastPara="1" wrap="square" lIns="0" tIns="0" rIns="0" bIns="0" anchor="t" anchorCtr="0">
-            <a:spAutoFit/>
-          </a:bodyPr>
-          <a:lstStyle/>
-          <a:p>
-            <a:pPr marL="0" marR="0" lvl="0" indent="0" algn="l" rtl="0">
-              <a:spcBef>
-                <a:spcPts val="0"/>
-              </a:spcBef>
-              <a:spcAft>
-                <a:spcPts val="0"/>
-              </a:spcAft>
-              <a:buNone/>
-            </a:pPr>
-            <a:r>
-              <a:rPr lang="en-US" sz="1404" b="1" i="0" u="none" strike="noStrike" cap="none">
-                <a:solidFill>
-                  <a:srgbClr val="F1F5F9"/>
-                </a:solidFill>
-                <a:latin typeface="Urbanist"/>
-                <a:ea typeface="Urbanist"/>
-                <a:cs typeface="Urbanist"/>
-                <a:sym typeface="Urbanist"/>
-              </a:rPr>
-              <a:t>Egyedi Adatvizualizáció</a:t>
-            </a:r>
-            <a:endParaRPr/>
-          </a:p>
-        </p:txBody>
-      </p:sp>
-      <p:sp>
-        <p:nvSpPr>
-          <p:cNvPr id="168" name="Google Shape;168;p18"/>
-          <p:cNvSpPr txBox="1"/>
-          <p:nvPr/>
-        </p:nvSpPr>
-        <p:spPr>
-          <a:xfrm>
-            <a:off x="571500" y="2847975"/>
-            <a:ext cx="5238750" cy="619125"/>
-          </a:xfrm>
-          <a:prstGeom prst="rect">
-            <a:avLst/>
-          </a:prstGeom>
-          <a:noFill/>
-          <a:ln>
-            <a:noFill/>
-          </a:ln>
-        </p:spPr>
-        <p:txBody>
-          <a:bodyPr spcFirstLastPara="1" wrap="square" lIns="0" tIns="0" rIns="0" bIns="0" anchor="t" anchorCtr="0">
-            <a:spAutoFit/>
-          </a:bodyPr>
-          <a:lstStyle/>
-          <a:p>
-            <a:pPr marL="0" marR="0" lvl="0" indent="0" algn="l" rtl="0">
-              <a:lnSpc>
-                <a:spcPct val="160000"/>
-              </a:lnSpc>
-              <a:spcBef>
-                <a:spcPts val="0"/>
-              </a:spcBef>
-              <a:spcAft>
-                <a:spcPts val="0"/>
-              </a:spcAft>
-              <a:buNone/>
-            </a:pPr>
-            <a:r>
-              <a:rPr lang="en-US" sz="1500" b="0" i="0" u="none" strike="noStrike" cap="none">
-                <a:solidFill>
-                  <a:srgbClr val="CBD5E1"/>
-                </a:solidFill>
-                <a:latin typeface="Urbanist"/>
-                <a:ea typeface="Urbanist"/>
-                <a:cs typeface="Urbanist"/>
-                <a:sym typeface="Urbanist"/>
-              </a:rPr>
-              <a:t>A projekt nem csak híreket, hanem egy szöveges fájlt is képes feldolgozni (andrisErkezes.txt).</a:t>
-            </a:r>
-            <a:endParaRPr/>
-          </a:p>
-        </p:txBody>
-      </p:sp>
-      <p:pic>
-        <p:nvPicPr>
-          <p:cNvPr id="169" name="Google Shape;169;p18" descr="image.png"/>
-          <p:cNvPicPr preferRelativeResize="0"/>
-          <p:nvPr/>
-        </p:nvPicPr>
-        <p:blipFill rotWithShape="1">
-          <a:blip r:embed="rId5">
-            <a:alphaModFix/>
-          </a:blip>
-          <a:srcRect/>
-          <a:stretch/>
-        </p:blipFill>
-        <p:spPr>
-          <a:xfrm>
-            <a:off x="6391275" y="2200275"/>
-            <a:ext cx="5219700" cy="3790950"/>
-          </a:xfrm>
-          <a:prstGeom prst="rect">
-            <a:avLst/>
-          </a:prstGeom>
-          <a:noFill/>
-          <a:ln>
-            <a:noFill/>
-          </a:ln>
-        </p:spPr>
-      </p:pic>
-      <p:sp>
-        <p:nvSpPr>
-          <p:cNvPr id="170" name="Google Shape;170;p18"/>
-          <p:cNvSpPr txBox="1"/>
-          <p:nvPr/>
-        </p:nvSpPr>
-        <p:spPr>
-          <a:xfrm>
-            <a:off x="857250" y="3657600"/>
-            <a:ext cx="4953000" cy="304800"/>
-          </a:xfrm>
-          <a:prstGeom prst="rect">
-            <a:avLst/>
-          </a:prstGeom>
-          <a:noFill/>
-          <a:ln>
-            <a:noFill/>
-          </a:ln>
-        </p:spPr>
-        <p:txBody>
-          <a:bodyPr spcFirstLastPara="1" wrap="square" lIns="0" tIns="0" rIns="0" bIns="0" anchor="t" anchorCtr="0">
-            <a:spAutoFit/>
-          </a:bodyPr>
-          <a:lstStyle/>
-          <a:p>
-            <a:pPr marL="0" marR="0" lvl="0" indent="0" algn="l" rtl="0">
-              <a:lnSpc>
-                <a:spcPct val="160000"/>
-              </a:lnSpc>
-              <a:spcBef>
-                <a:spcPts val="0"/>
-              </a:spcBef>
-              <a:spcAft>
-                <a:spcPts val="0"/>
-              </a:spcAft>
-              <a:buNone/>
-            </a:pPr>
-            <a:r>
-              <a:rPr lang="en-US" sz="1500" b="0" i="0" u="none" strike="noStrike" cap="none">
-                <a:solidFill>
-                  <a:srgbClr val="CBD5E1"/>
-                </a:solidFill>
-                <a:latin typeface="Urbanist"/>
-                <a:ea typeface="Urbanist"/>
-                <a:cs typeface="Urbanist"/>
-                <a:sym typeface="Urbanist"/>
-              </a:rPr>
-              <a:t>A program kiolvassa az időpontokat a fájlból.</a:t>
-            </a:r>
-            <a:endParaRPr/>
-          </a:p>
-        </p:txBody>
-      </p:sp>
-      <p:sp>
-        <p:nvSpPr>
-          <p:cNvPr id="171" name="Google Shape;171;p18"/>
-          <p:cNvSpPr txBox="1"/>
-          <p:nvPr/>
-        </p:nvSpPr>
-        <p:spPr>
-          <a:xfrm>
-            <a:off x="857250" y="4152900"/>
-            <a:ext cx="4953000" cy="609600"/>
-          </a:xfrm>
-          <a:prstGeom prst="rect">
-            <a:avLst/>
-          </a:prstGeom>
-          <a:noFill/>
-          <a:ln>
-            <a:noFill/>
-          </a:ln>
-        </p:spPr>
-        <p:txBody>
-          <a:bodyPr spcFirstLastPara="1" wrap="square" lIns="0" tIns="0" rIns="0" bIns="0" anchor="t" anchorCtr="0">
-            <a:spAutoFit/>
-          </a:bodyPr>
-          <a:lstStyle/>
-          <a:p>
-            <a:pPr marL="0" marR="0" lvl="0" indent="0" algn="l" rtl="0">
-              <a:lnSpc>
-                <a:spcPct val="160000"/>
-              </a:lnSpc>
-              <a:spcBef>
-                <a:spcPts val="0"/>
-              </a:spcBef>
-              <a:spcAft>
-                <a:spcPts val="0"/>
-              </a:spcAft>
-              <a:buNone/>
-            </a:pPr>
-            <a:r>
-              <a:rPr lang="en-US" sz="1500" b="0" i="0" u="none" strike="noStrike" cap="none">
-                <a:solidFill>
-                  <a:srgbClr val="CBD5E1"/>
-                </a:solidFill>
-                <a:latin typeface="Urbanist"/>
-                <a:ea typeface="Urbanist"/>
-                <a:cs typeface="Urbanist"/>
-                <a:sym typeface="Urbanist"/>
-              </a:rPr>
-              <a:t>Ábrázolja, hogyan alakulnak az érkezések reggel 8:00 és 9:00 között.</a:t>
-            </a:r>
-            <a:endParaRPr/>
-          </a:p>
-        </p:txBody>
-      </p:sp>
-      <p:sp>
-        <p:nvSpPr>
-          <p:cNvPr id="172" name="Google Shape;172;p18"/>
-          <p:cNvSpPr txBox="1"/>
-          <p:nvPr/>
-        </p:nvSpPr>
-        <p:spPr>
-          <a:xfrm>
-            <a:off x="857250" y="4953000"/>
-            <a:ext cx="4953000" cy="609600"/>
-          </a:xfrm>
-          <a:prstGeom prst="rect">
-            <a:avLst/>
-          </a:prstGeom>
-          <a:noFill/>
-          <a:ln>
-            <a:noFill/>
-          </a:ln>
-        </p:spPr>
-        <p:txBody>
-          <a:bodyPr spcFirstLastPara="1" wrap="square" lIns="0" tIns="0" rIns="0" bIns="0" anchor="t" anchorCtr="0">
-            <a:spAutoFit/>
-          </a:bodyPr>
-          <a:lstStyle/>
-          <a:p>
-            <a:pPr marL="0" marR="0" lvl="0" indent="0" algn="l" rtl="0">
-              <a:lnSpc>
-                <a:spcPct val="160000"/>
-              </a:lnSpc>
-              <a:spcBef>
-                <a:spcPts val="0"/>
-              </a:spcBef>
-              <a:spcAft>
-                <a:spcPts val="0"/>
-              </a:spcAft>
-              <a:buNone/>
-            </a:pPr>
-            <a:r>
-              <a:rPr lang="en-US" sz="1500" b="0" i="0" u="none" strike="noStrike" cap="none">
-                <a:solidFill>
-                  <a:srgbClr val="CBD5E1"/>
-                </a:solidFill>
-                <a:latin typeface="Urbanist"/>
-                <a:ea typeface="Urbanist"/>
-                <a:cs typeface="Urbanist"/>
-                <a:sym typeface="Urbanist"/>
-              </a:rPr>
-              <a:t>Ez mutatja, hogy a rendszer bármilyen szöveges adattal megbirkózik.</a:t>
-            </a:r>
-            <a:endParaRPr/>
-          </a:p>
-        </p:txBody>
-      </p:sp>
-      <p:sp>
-        <p:nvSpPr>
-          <p:cNvPr id="173" name="Google Shape;173;p18"/>
-          <p:cNvSpPr txBox="1"/>
-          <p:nvPr/>
-        </p:nvSpPr>
-        <p:spPr>
-          <a:xfrm>
-            <a:off x="571500" y="571500"/>
-            <a:ext cx="11601450" cy="571500"/>
-          </a:xfrm>
-          <a:prstGeom prst="rect">
-            <a:avLst/>
-          </a:prstGeom>
-          <a:noFill/>
-          <a:ln>
-            <a:noFill/>
-          </a:ln>
-        </p:spPr>
-        <p:txBody>
-          <a:bodyPr spcFirstLastPara="1" wrap="square" lIns="0" tIns="0" rIns="0" bIns="0" anchor="t" anchorCtr="0">
-            <a:spAutoFit/>
-          </a:bodyPr>
-          <a:lstStyle/>
-          <a:p>
-            <a:pPr marL="0" marR="0" lvl="0" indent="0" algn="l" rtl="0">
-              <a:spcBef>
-                <a:spcPts val="0"/>
-              </a:spcBef>
-              <a:spcAft>
-                <a:spcPts val="0"/>
-              </a:spcAft>
-              <a:buNone/>
-            </a:pPr>
-            <a:r>
-              <a:rPr lang="en-US" sz="3600" b="1" i="0" u="none" strike="noStrike" cap="none">
-                <a:solidFill>
-                  <a:srgbClr val="F1F5F9"/>
-                </a:solidFill>
-                <a:latin typeface="Urbanist"/>
-                <a:ea typeface="Urbanist"/>
-                <a:cs typeface="Urbanist"/>
-                <a:sym typeface="Urbanist"/>
-              </a:rPr>
-              <a:t>Mikor érkezik Andris?</a:t>
-            </a:r>
-            <a:endParaRPr/>
-          </a:p>
-        </p:txBody>
-      </p:sp>
-      <p:sp>
-        <p:nvSpPr>
-          <p:cNvPr id="174" name="Google Shape;174;p18"/>
-          <p:cNvSpPr/>
-          <p:nvPr/>
-        </p:nvSpPr>
-        <p:spPr>
-          <a:xfrm>
-            <a:off x="571500" y="1314450"/>
-            <a:ext cx="11049000" cy="19050"/>
-          </a:xfrm>
-          <a:prstGeom prst="rect">
-            <a:avLst/>
-          </a:prstGeom>
-          <a:solidFill>
-            <a:srgbClr val="3B82F6"/>
-          </a:solidFill>
-          <a:ln>
-            <a:noFill/>
-          </a:ln>
-        </p:spPr>
-        <p:txBody>
-          <a:bodyPr spcFirstLastPara="1" wrap="square" lIns="91425" tIns="45700" rIns="91425" bIns="45700" anchor="ctr" anchorCtr="0">
-            <a:noAutofit/>
-          </a:bodyPr>
-          <a:lstStyle/>
-          <a:p>
-            <a:pPr marL="0" marR="0" lvl="0" indent="0" algn="ctr" rtl="0">
-              <a:spcBef>
-                <a:spcPts val="0"/>
-              </a:spcBef>
-              <a:spcAft>
-                <a:spcPts val="0"/>
-              </a:spcAft>
-              <a:buNone/>
-            </a:pPr>
-            <a:endParaRPr sz="1800" b="0" i="0" u="none" strike="noStrike" cap="none">
-              <a:solidFill>
-                <a:schemeClr val="dk1"/>
-              </a:solidFill>
-              <a:latin typeface="Calibri"/>
-              <a:ea typeface="Calibri"/>
-              <a:cs typeface="Calibri"/>
-              <a:sym typeface="Calibri"/>
-            </a:endParaRPr>
-          </a:p>
-        </p:txBody>
-      </p:sp>
-      <p:pic>
-        <p:nvPicPr>
-          <p:cNvPr id="175" name="Google Shape;175;p18" descr="image.png"/>
-          <p:cNvPicPr preferRelativeResize="0"/>
-          <p:nvPr/>
-        </p:nvPicPr>
-        <p:blipFill rotWithShape="1">
-          <a:blip r:embed="rId6">
-            <a:alphaModFix/>
-          </a:blip>
-          <a:srcRect/>
-          <a:stretch/>
-        </p:blipFill>
-        <p:spPr>
-          <a:xfrm>
-            <a:off x="571500" y="3695700"/>
-            <a:ext cx="190500" cy="200025"/>
-          </a:xfrm>
-          <a:prstGeom prst="rect">
-            <a:avLst/>
-          </a:prstGeom>
-          <a:noFill/>
-          <a:ln>
-            <a:noFill/>
-          </a:ln>
-        </p:spPr>
-      </p:pic>
-      <p:pic>
-        <p:nvPicPr>
-          <p:cNvPr id="176" name="Google Shape;176;p18" descr="image.png"/>
-          <p:cNvPicPr preferRelativeResize="0"/>
-          <p:nvPr/>
-        </p:nvPicPr>
-        <p:blipFill rotWithShape="1">
-          <a:blip r:embed="rId6">
-            <a:alphaModFix/>
-          </a:blip>
-          <a:srcRect/>
-          <a:stretch/>
-        </p:blipFill>
-        <p:spPr>
-          <a:xfrm>
-            <a:off x="571500" y="4191000"/>
-            <a:ext cx="190500" cy="200025"/>
-          </a:xfrm>
-          <a:prstGeom prst="rect">
-            <a:avLst/>
-          </a:prstGeom>
-          <a:noFill/>
-          <a:ln>
-            <a:noFill/>
-          </a:ln>
-        </p:spPr>
-      </p:pic>
-      <p:pic>
-        <p:nvPicPr>
-          <p:cNvPr id="177" name="Google Shape;177;p18" descr="image.png"/>
-          <p:cNvPicPr preferRelativeResize="0"/>
-          <p:nvPr/>
-        </p:nvPicPr>
-        <p:blipFill rotWithShape="1">
-          <a:blip r:embed="rId6">
-            <a:alphaModFix/>
-          </a:blip>
-          <a:srcRect/>
-          <a:stretch/>
-        </p:blipFill>
-        <p:spPr>
-          <a:xfrm>
-            <a:off x="571500" y="4991100"/>
-            <a:ext cx="190500" cy="200025"/>
-          </a:xfrm>
-          <a:prstGeom prst="rect">
-            <a:avLst/>
-          </a:prstGeom>
-          <a:noFill/>
-          <a:ln>
-            <a:noFill/>
-          </a:ln>
-        </p:spPr>
-      </p:pic>
-    </p:spTree>
-  </p:cSld>
-  <p:clrMapOvr>
-    <a:masterClrMapping/>
-  </p:clrMapOvr>
-</p:sld>
-</file>
-
-<file path=ppt/slides/slide7.xml><?xml version="1.0" encoding="utf-8"?>
 <p:sld xmlns:a="http://schemas.openxmlformats.org/drawingml/2006/main" xmlns:r="http://schemas.openxmlformats.org/officeDocument/2006/relationships" xmlns:p="http://schemas.openxmlformats.org/presentationml/2006/main">
   <p:cSld>
     <p:bg>
@@ -14915,33 +15023,6 @@
           </a:p>
         </p:txBody>
       </p:sp>
-      <p:pic>
-        <p:nvPicPr>
-          <p:cNvPr id="185" name="Google Shape;185;p19" descr="image.png"/>
-          <p:cNvPicPr preferRelativeResize="0"/>
-          <p:nvPr/>
-        </p:nvPicPr>
-        <p:blipFill rotWithShape="1">
-          <a:blip r:embed="rId4">
-            <a:alphaModFix/>
-          </a:blip>
-          <a:srcRect/>
-          <a:stretch/>
-        </p:blipFill>
-        <p:spPr>
-          <a:xfrm>
-            <a:off x="6096000" y="0"/>
-            <a:ext cx="6096000" cy="6858000"/>
-          </a:xfrm>
-          <a:prstGeom prst="rect">
-            <a:avLst/>
-          </a:prstGeom>
-          <a:noFill/>
-          <a:ln>
-            <a:noFill/>
-          </a:ln>
-        </p:spPr>
-      </p:pic>
       <p:sp>
         <p:nvSpPr>
           <p:cNvPr id="186" name="Google Shape;186;p19"/>
@@ -14980,7 +15061,7 @@
               <a:buNone/>
             </a:pPr>
             <a:r>
-              <a:rPr lang="en-US" sz="1500" b="0" i="0" u="none" strike="noStrike" cap="none">
+              <a:rPr lang="en-US" sz="1500" b="0" i="0" u="none" strike="noStrike" cap="none" dirty="0">
                 <a:solidFill>
                   <a:srgbClr val="CBD5E1"/>
                 </a:solidFill>
@@ -14989,10 +15070,178 @@
                 <a:cs typeface="Urbanist"/>
                 <a:sym typeface="Urbanist"/>
               </a:rPr>
-              <a:t>Minden elemzést egy közös, webes felületre raktunk össze a </a:t>
+              <a:t>Minden </a:t>
             </a:r>
             <a:r>
-              <a:rPr lang="en-US" sz="1500" b="1" i="0" u="none" strike="noStrike" cap="none">
+              <a:rPr lang="en-US" sz="1500" b="0" i="0" u="none" strike="noStrike" cap="none" dirty="0" err="1">
+                <a:solidFill>
+                  <a:srgbClr val="CBD5E1"/>
+                </a:solidFill>
+                <a:latin typeface="Urbanist"/>
+                <a:ea typeface="Urbanist"/>
+                <a:cs typeface="Urbanist"/>
+                <a:sym typeface="Urbanist"/>
+              </a:rPr>
+              <a:t>elemzést</a:t>
+            </a:r>
+            <a:r>
+              <a:rPr lang="en-US" sz="1500" b="0" i="0" u="none" strike="noStrike" cap="none" dirty="0">
+                <a:solidFill>
+                  <a:srgbClr val="CBD5E1"/>
+                </a:solidFill>
+                <a:latin typeface="Urbanist"/>
+                <a:ea typeface="Urbanist"/>
+                <a:cs typeface="Urbanist"/>
+                <a:sym typeface="Urbanist"/>
+              </a:rPr>
+              <a:t> </a:t>
+            </a:r>
+            <a:r>
+              <a:rPr lang="en-US" sz="1500" b="0" i="0" u="none" strike="noStrike" cap="none" dirty="0" err="1">
+                <a:solidFill>
+                  <a:srgbClr val="CBD5E1"/>
+                </a:solidFill>
+                <a:latin typeface="Urbanist"/>
+                <a:ea typeface="Urbanist"/>
+                <a:cs typeface="Urbanist"/>
+                <a:sym typeface="Urbanist"/>
+              </a:rPr>
+              <a:t>egy</a:t>
+            </a:r>
+            <a:r>
+              <a:rPr lang="en-US" sz="1500" b="0" i="0" u="none" strike="noStrike" cap="none" dirty="0">
+                <a:solidFill>
+                  <a:srgbClr val="CBD5E1"/>
+                </a:solidFill>
+                <a:latin typeface="Urbanist"/>
+                <a:ea typeface="Urbanist"/>
+                <a:cs typeface="Urbanist"/>
+                <a:sym typeface="Urbanist"/>
+              </a:rPr>
+              <a:t> </a:t>
+            </a:r>
+            <a:r>
+              <a:rPr lang="en-US" sz="1500" b="0" i="0" u="none" strike="noStrike" cap="none" dirty="0" err="1">
+                <a:solidFill>
+                  <a:srgbClr val="CBD5E1"/>
+                </a:solidFill>
+                <a:latin typeface="Urbanist"/>
+                <a:ea typeface="Urbanist"/>
+                <a:cs typeface="Urbanist"/>
+                <a:sym typeface="Urbanist"/>
+              </a:rPr>
+              <a:t>közös</a:t>
+            </a:r>
+            <a:r>
+              <a:rPr lang="en-US" sz="1500" b="0" i="0" u="none" strike="noStrike" cap="none" dirty="0">
+                <a:solidFill>
+                  <a:srgbClr val="CBD5E1"/>
+                </a:solidFill>
+                <a:latin typeface="Urbanist"/>
+                <a:ea typeface="Urbanist"/>
+                <a:cs typeface="Urbanist"/>
+                <a:sym typeface="Urbanist"/>
+              </a:rPr>
+              <a:t>, </a:t>
+            </a:r>
+            <a:r>
+              <a:rPr lang="en-US" sz="1500" b="0" i="0" u="none" strike="noStrike" cap="none" dirty="0" err="1">
+                <a:solidFill>
+                  <a:srgbClr val="CBD5E1"/>
+                </a:solidFill>
+                <a:latin typeface="Urbanist"/>
+                <a:ea typeface="Urbanist"/>
+                <a:cs typeface="Urbanist"/>
+                <a:sym typeface="Urbanist"/>
+              </a:rPr>
+              <a:t>webes</a:t>
+            </a:r>
+            <a:r>
+              <a:rPr lang="en-US" sz="1500" b="0" i="0" u="none" strike="noStrike" cap="none" dirty="0">
+                <a:solidFill>
+                  <a:srgbClr val="CBD5E1"/>
+                </a:solidFill>
+                <a:latin typeface="Urbanist"/>
+                <a:ea typeface="Urbanist"/>
+                <a:cs typeface="Urbanist"/>
+                <a:sym typeface="Urbanist"/>
+              </a:rPr>
+              <a:t> </a:t>
+            </a:r>
+            <a:r>
+              <a:rPr lang="en-US" sz="1500" b="0" i="0" u="none" strike="noStrike" cap="none" dirty="0" err="1">
+                <a:solidFill>
+                  <a:srgbClr val="CBD5E1"/>
+                </a:solidFill>
+                <a:latin typeface="Urbanist"/>
+                <a:ea typeface="Urbanist"/>
+                <a:cs typeface="Urbanist"/>
+                <a:sym typeface="Urbanist"/>
+              </a:rPr>
+              <a:t>felületre</a:t>
+            </a:r>
+            <a:r>
+              <a:rPr lang="en-US" sz="1500" b="0" i="0" u="none" strike="noStrike" cap="none" dirty="0">
+                <a:solidFill>
+                  <a:srgbClr val="CBD5E1"/>
+                </a:solidFill>
+                <a:latin typeface="Urbanist"/>
+                <a:ea typeface="Urbanist"/>
+                <a:cs typeface="Urbanist"/>
+                <a:sym typeface="Urbanist"/>
+              </a:rPr>
+              <a:t> </a:t>
+            </a:r>
+            <a:r>
+              <a:rPr lang="en-US" sz="1500" b="0" i="0" u="none" strike="noStrike" cap="none" dirty="0" err="1">
+                <a:solidFill>
+                  <a:srgbClr val="CBD5E1"/>
+                </a:solidFill>
+                <a:latin typeface="Urbanist"/>
+                <a:ea typeface="Urbanist"/>
+                <a:cs typeface="Urbanist"/>
+                <a:sym typeface="Urbanist"/>
+              </a:rPr>
+              <a:t>raktunk</a:t>
+            </a:r>
+            <a:r>
+              <a:rPr lang="en-US" sz="1500" b="0" i="0" u="none" strike="noStrike" cap="none" dirty="0">
+                <a:solidFill>
+                  <a:srgbClr val="CBD5E1"/>
+                </a:solidFill>
+                <a:latin typeface="Urbanist"/>
+                <a:ea typeface="Urbanist"/>
+                <a:cs typeface="Urbanist"/>
+                <a:sym typeface="Urbanist"/>
+              </a:rPr>
+              <a:t> </a:t>
+            </a:r>
+            <a:r>
+              <a:rPr lang="en-US" sz="1500" b="0" i="0" u="none" strike="noStrike" cap="none" dirty="0" err="1">
+                <a:solidFill>
+                  <a:srgbClr val="CBD5E1"/>
+                </a:solidFill>
+                <a:latin typeface="Urbanist"/>
+                <a:ea typeface="Urbanist"/>
+                <a:cs typeface="Urbanist"/>
+                <a:sym typeface="Urbanist"/>
+              </a:rPr>
+              <a:t>össze</a:t>
+            </a:r>
+            <a:r>
+              <a:rPr lang="en-US" sz="1500" b="0" i="0" u="none" strike="noStrike" cap="none" dirty="0">
+                <a:solidFill>
+                  <a:srgbClr val="CBD5E1"/>
+                </a:solidFill>
+                <a:latin typeface="Urbanist"/>
+                <a:ea typeface="Urbanist"/>
+                <a:cs typeface="Urbanist"/>
+                <a:sym typeface="Urbanist"/>
+              </a:rPr>
+              <a:t> a </a:t>
+            </a:r>
+            <a:r>
+              <a:rPr lang="en-US" sz="1500" b="1" i="0" u="none" strike="noStrike" cap="none" dirty="0">
                 <a:solidFill>
                   <a:srgbClr val="CBD5E1"/>
                 </a:solidFill>
@@ -15004,7 +15253,7 @@
               <a:t>Panel</a:t>
             </a:r>
             <a:r>
-              <a:rPr lang="en-US" sz="1500" b="0" i="0" u="none" strike="noStrike" cap="none">
+              <a:rPr lang="en-US" sz="1500" b="0" i="0" u="none" strike="noStrike" cap="none" dirty="0">
                 <a:solidFill>
                   <a:srgbClr val="CBD5E1"/>
                 </a:solidFill>
@@ -15013,9 +15262,57 @@
                 <a:cs typeface="Urbanist"/>
                 <a:sym typeface="Urbanist"/>
               </a:rPr>
-              <a:t> könyvtár segítségével.</a:t>
+              <a:t> </a:t>
             </a:r>
-            <a:endParaRPr/>
+            <a:r>
+              <a:rPr lang="en-US" sz="1500" b="0" i="0" u="none" strike="noStrike" cap="none" dirty="0" err="1">
+                <a:solidFill>
+                  <a:srgbClr val="CBD5E1"/>
+                </a:solidFill>
+                <a:latin typeface="Urbanist"/>
+                <a:ea typeface="Urbanist"/>
+                <a:cs typeface="Urbanist"/>
+                <a:sym typeface="Urbanist"/>
+              </a:rPr>
+              <a:t>könyvtár</a:t>
+            </a:r>
+            <a:r>
+              <a:rPr lang="en-US" sz="1500" b="0" i="0" u="none" strike="noStrike" cap="none" dirty="0">
+                <a:solidFill>
+                  <a:srgbClr val="CBD5E1"/>
+                </a:solidFill>
+                <a:latin typeface="Urbanist"/>
+                <a:ea typeface="Urbanist"/>
+                <a:cs typeface="Urbanist"/>
+                <a:sym typeface="Urbanist"/>
+              </a:rPr>
+              <a:t> </a:t>
+            </a:r>
+            <a:r>
+              <a:rPr lang="en-US" sz="1500" b="0" i="0" u="none" strike="noStrike" cap="none" dirty="0" err="1">
+                <a:solidFill>
+                  <a:srgbClr val="CBD5E1"/>
+                </a:solidFill>
+                <a:latin typeface="Urbanist"/>
+                <a:ea typeface="Urbanist"/>
+                <a:cs typeface="Urbanist"/>
+                <a:sym typeface="Urbanist"/>
+              </a:rPr>
+              <a:t>segítségével</a:t>
+            </a:r>
+            <a:r>
+              <a:rPr lang="en-US" sz="1500" b="0" i="0" u="none" strike="noStrike" cap="none" dirty="0">
+                <a:solidFill>
+                  <a:srgbClr val="CBD5E1"/>
+                </a:solidFill>
+                <a:latin typeface="Urbanist"/>
+                <a:ea typeface="Urbanist"/>
+                <a:cs typeface="Urbanist"/>
+                <a:sym typeface="Urbanist"/>
+              </a:rPr>
+              <a:t>.</a:t>
+            </a:r>
+            <a:endParaRPr dirty="0"/>
           </a:p>
         </p:txBody>
       </p:sp>
@@ -15238,7 +15535,7 @@
           <p:nvPr/>
         </p:nvPicPr>
         <p:blipFill rotWithShape="1">
-          <a:blip r:embed="rId5">
+          <a:blip r:embed="rId4">
             <a:alphaModFix/>
           </a:blip>
           <a:srcRect/>
@@ -15265,7 +15562,7 @@
           <p:nvPr/>
         </p:nvPicPr>
         <p:blipFill rotWithShape="1">
-          <a:blip r:embed="rId5">
+          <a:blip r:embed="rId4">
             <a:alphaModFix/>
           </a:blip>
           <a:srcRect/>
@@ -15292,7 +15589,7 @@
           <p:nvPr/>
         </p:nvPicPr>
         <p:blipFill rotWithShape="1">
-          <a:blip r:embed="rId5">
+          <a:blip r:embed="rId4">
             <a:alphaModFix/>
           </a:blip>
           <a:srcRect/>
@@ -15319,7 +15616,7 @@
           <p:nvPr/>
         </p:nvPicPr>
         <p:blipFill rotWithShape="1">
-          <a:blip r:embed="rId5">
+          <a:blip r:embed="rId4">
             <a:alphaModFix/>
           </a:blip>
           <a:srcRect/>
@@ -15339,6 +15636,36 @@
           </a:ln>
         </p:spPr>
       </p:pic>
+      <p:pic>
+        <p:nvPicPr>
+          <p:cNvPr id="5" name="Kép 4" descr="A képen képernyőkép, szöveg, szoftver, Multimédiás szoftver látható&#10;&#10;Előfordulhat, hogy az AI által létrehozott tartalom helytelen.">
+            <a:extLst>
+              <a:ext uri="{FF2B5EF4-FFF2-40B4-BE49-F238E27FC236}">
+                <a16:creationId xmlns:a16="http://schemas.microsoft.com/office/drawing/2014/main" id="{DEEC4C05-B5F0-3EA5-5FB4-FF2657B2ACC5}"/>
+              </a:ext>
+            </a:extLst>
+          </p:cNvPr>
+          <p:cNvPicPr>
+            <a:picLocks noChangeAspect="1"/>
+          </p:cNvPicPr>
+          <p:nvPr/>
+        </p:nvPicPr>
+        <p:blipFill>
+          <a:blip r:embed="rId5"/>
+          <a:stretch>
+            <a:fillRect/>
+          </a:stretch>
+        </p:blipFill>
+        <p:spPr>
+          <a:xfrm>
+            <a:off x="5795962" y="0"/>
+            <a:ext cx="6391275" cy="6858000"/>
+          </a:xfrm>
+          <a:prstGeom prst="rect">
+            <a:avLst/>
+          </a:prstGeom>
+        </p:spPr>
+      </p:pic>
     </p:spTree>
   </p:cSld>
   <p:clrMapOvr>
@@ -15347,7 +15674,7 @@
 </p:sld>
 </file>
 
-<file path=ppt/slides/slide8.xml><?xml version="1.0" encoding="utf-8"?>
+<file path=ppt/slides/slide7.xml><?xml version="1.0" encoding="utf-8"?>
 <p:sld xmlns:a="http://schemas.openxmlformats.org/drawingml/2006/main" xmlns:r="http://schemas.openxmlformats.org/officeDocument/2006/relationships" xmlns:p="http://schemas.openxmlformats.org/presentationml/2006/main">
   <p:cSld>
     <p:bg>
@@ -15493,7 +15820,7 @@
 </p:sld>
 </file>
 
-<file path=ppt/slides/slide9.xml><?xml version="1.0" encoding="utf-8"?>
+<file path=ppt/slides/slide8.xml><?xml version="1.0" encoding="utf-8"?>
 <p:sld xmlns:a="http://schemas.openxmlformats.org/drawingml/2006/main" xmlns:r="http://schemas.openxmlformats.org/officeDocument/2006/relationships" xmlns:p="http://schemas.openxmlformats.org/presentationml/2006/main">
   <p:cSld>
     <p:bg>
@@ -15533,35 +15860,8 @@
         </p:blipFill>
         <p:spPr>
           <a:xfrm>
-            <a:off x="0" y="0"/>
+            <a:off x="-19050" y="20984"/>
             <a:ext cx="12192000" cy="6858000"/>
-          </a:xfrm>
-          <a:prstGeom prst="rect">
-            <a:avLst/>
-          </a:prstGeom>
-          <a:noFill/>
-          <a:ln>
-            <a:noFill/>
-          </a:ln>
-        </p:spPr>
-      </p:pic>
-      <p:pic>
-        <p:nvPicPr>
-          <p:cNvPr id="207" name="Google Shape;207;p21" descr="image.png"/>
-          <p:cNvPicPr preferRelativeResize="0"/>
-          <p:nvPr/>
-        </p:nvPicPr>
-        <p:blipFill rotWithShape="1">
-          <a:blip r:embed="rId4">
-            <a:alphaModFix/>
-          </a:blip>
-          <a:srcRect/>
-          <a:stretch/>
-        </p:blipFill>
-        <p:spPr>
-          <a:xfrm>
-            <a:off x="571500" y="2077640"/>
-            <a:ext cx="148232" cy="219075"/>
           </a:xfrm>
           <a:prstGeom prst="rect">
             <a:avLst/>
@@ -15620,33 +15920,6 @@
           </a:p>
         </p:txBody>
       </p:sp>
-      <p:pic>
-        <p:nvPicPr>
-          <p:cNvPr id="209" name="Google Shape;209;p21" descr="image.png"/>
-          <p:cNvPicPr preferRelativeResize="0"/>
-          <p:nvPr/>
-        </p:nvPicPr>
-        <p:blipFill rotWithShape="1">
-          <a:blip r:embed="rId4">
-            <a:alphaModFix/>
-          </a:blip>
-          <a:srcRect/>
-          <a:stretch/>
-        </p:blipFill>
-        <p:spPr>
-          <a:xfrm>
-            <a:off x="571500" y="2862411"/>
-            <a:ext cx="148232" cy="219075"/>
-          </a:xfrm>
-          <a:prstGeom prst="rect">
-            <a:avLst/>
-          </a:prstGeom>
-          <a:noFill/>
-          <a:ln>
-            <a:noFill/>
-          </a:ln>
-        </p:spPr>
-      </p:pic>
       <p:sp>
         <p:nvSpPr>
           <p:cNvPr id="210" name="Google Shape;210;p21"/>
@@ -15697,189 +15970,12 @@
       </p:sp>
       <p:pic>
         <p:nvPicPr>
-          <p:cNvPr id="211" name="Google Shape;211;p21" descr="image.png"/>
+          <p:cNvPr id="216" name="Google Shape;216;p21" descr="image.png"/>
           <p:cNvPicPr preferRelativeResize="0"/>
           <p:nvPr/>
         </p:nvPicPr>
         <p:blipFill rotWithShape="1">
           <a:blip r:embed="rId4">
-            <a:alphaModFix/>
-          </a:blip>
-          <a:srcRect/>
-          <a:stretch/>
-        </p:blipFill>
-        <p:spPr>
-          <a:xfrm>
-            <a:off x="571500" y="3647182"/>
-            <a:ext cx="148232" cy="219075"/>
-          </a:xfrm>
-          <a:prstGeom prst="rect">
-            <a:avLst/>
-          </a:prstGeom>
-          <a:noFill/>
-          <a:ln>
-            <a:noFill/>
-          </a:ln>
-        </p:spPr>
-      </p:pic>
-      <p:sp>
-        <p:nvSpPr>
-          <p:cNvPr id="212" name="Google Shape;212;p21"/>
-          <p:cNvSpPr/>
-          <p:nvPr/>
-        </p:nvSpPr>
-        <p:spPr>
-          <a:xfrm>
-            <a:off x="571500" y="4384327"/>
-            <a:ext cx="11049000" cy="9525"/>
-          </a:xfrm>
-          <a:prstGeom prst="rect">
-            <a:avLst/>
-          </a:prstGeom>
-          <a:solidFill>
-            <a:srgbClr val="757575"/>
-          </a:solidFill>
-          <a:ln>
-            <a:noFill/>
-          </a:ln>
-        </p:spPr>
-        <p:txBody>
-          <a:bodyPr spcFirstLastPara="1" wrap="square" lIns="91425" tIns="45700" rIns="91425" bIns="45700" anchor="ctr" anchorCtr="0">
-            <a:noAutofit/>
-          </a:bodyPr>
-          <a:lstStyle/>
-          <a:p>
-            <a:pPr marL="0" marR="0" lvl="0" indent="0" algn="ctr" rtl="0">
-              <a:spcBef>
-                <a:spcPts val="0"/>
-              </a:spcBef>
-              <a:spcAft>
-                <a:spcPts val="0"/>
-              </a:spcAft>
-              <a:buNone/>
-            </a:pPr>
-            <a:endParaRPr sz="1800" b="0" i="0" u="none" strike="noStrike" cap="none">
-              <a:solidFill>
-                <a:schemeClr val="dk1"/>
-              </a:solidFill>
-              <a:latin typeface="Calibri"/>
-              <a:ea typeface="Calibri"/>
-              <a:cs typeface="Calibri"/>
-              <a:sym typeface="Calibri"/>
-            </a:endParaRPr>
-          </a:p>
-        </p:txBody>
-      </p:sp>
-      <p:pic>
-        <p:nvPicPr>
-          <p:cNvPr id="213" name="Google Shape;213;p21" descr="image.png"/>
-          <p:cNvPicPr preferRelativeResize="0"/>
-          <p:nvPr/>
-        </p:nvPicPr>
-        <p:blipFill rotWithShape="1">
-          <a:blip r:embed="rId4">
-            <a:alphaModFix/>
-          </a:blip>
-          <a:srcRect/>
-          <a:stretch/>
-        </p:blipFill>
-        <p:spPr>
-          <a:xfrm>
-            <a:off x="571500" y="4431952"/>
-            <a:ext cx="148232" cy="219075"/>
-          </a:xfrm>
-          <a:prstGeom prst="rect">
-            <a:avLst/>
-          </a:prstGeom>
-          <a:noFill/>
-          <a:ln>
-            <a:noFill/>
-          </a:ln>
-        </p:spPr>
-      </p:pic>
-      <p:sp>
-        <p:nvSpPr>
-          <p:cNvPr id="214" name="Google Shape;214;p21"/>
-          <p:cNvSpPr/>
-          <p:nvPr/>
-        </p:nvSpPr>
-        <p:spPr>
-          <a:xfrm>
-            <a:off x="571500" y="5367188"/>
-            <a:ext cx="11049000" cy="9525"/>
-          </a:xfrm>
-          <a:prstGeom prst="rect">
-            <a:avLst/>
-          </a:prstGeom>
-          <a:solidFill>
-            <a:srgbClr val="757575"/>
-          </a:solidFill>
-          <a:ln>
-            <a:noFill/>
-          </a:ln>
-        </p:spPr>
-        <p:txBody>
-          <a:bodyPr spcFirstLastPara="1" wrap="square" lIns="91425" tIns="45700" rIns="91425" bIns="45700" anchor="ctr" anchorCtr="0">
-            <a:noAutofit/>
-          </a:bodyPr>
-          <a:lstStyle/>
-          <a:p>
-            <a:pPr marL="0" marR="0" lvl="0" indent="0" algn="ctr" rtl="0">
-              <a:spcBef>
-                <a:spcPts val="0"/>
-              </a:spcBef>
-              <a:spcAft>
-                <a:spcPts val="0"/>
-              </a:spcAft>
-              <a:buNone/>
-            </a:pPr>
-            <a:endParaRPr sz="1800" b="0" i="0" u="none" strike="noStrike" cap="none">
-              <a:solidFill>
-                <a:schemeClr val="dk1"/>
-              </a:solidFill>
-              <a:latin typeface="Calibri"/>
-              <a:ea typeface="Calibri"/>
-              <a:cs typeface="Calibri"/>
-              <a:sym typeface="Calibri"/>
-            </a:endParaRPr>
-          </a:p>
-        </p:txBody>
-      </p:sp>
-      <p:pic>
-        <p:nvPicPr>
-          <p:cNvPr id="215" name="Google Shape;215;p21" descr="image.png"/>
-          <p:cNvPicPr preferRelativeResize="0"/>
-          <p:nvPr/>
-        </p:nvPicPr>
-        <p:blipFill rotWithShape="1">
-          <a:blip r:embed="rId4">
-            <a:alphaModFix/>
-          </a:blip>
-          <a:srcRect/>
-          <a:stretch/>
-        </p:blipFill>
-        <p:spPr>
-          <a:xfrm>
-            <a:off x="571500" y="5414813"/>
-            <a:ext cx="148232" cy="219075"/>
-          </a:xfrm>
-          <a:prstGeom prst="rect">
-            <a:avLst/>
-          </a:prstGeom>
-          <a:noFill/>
-          <a:ln>
-            <a:noFill/>
-          </a:ln>
-        </p:spPr>
-      </p:pic>
-      <p:pic>
-        <p:nvPicPr>
-          <p:cNvPr id="216" name="Google Shape;216;p21" descr="image.png"/>
-          <p:cNvPicPr preferRelativeResize="0"/>
-          <p:nvPr/>
-        </p:nvPicPr>
-        <p:blipFill rotWithShape="1">
-          <a:blip r:embed="rId5">
             <a:alphaModFix/>
           </a:blip>
           <a:srcRect/>
@@ -16024,7 +16120,7 @@
           <p:nvPr/>
         </p:nvPicPr>
         <p:blipFill rotWithShape="1">
-          <a:blip r:embed="rId6">
+          <a:blip r:embed="rId5">
             <a:alphaModFix/>
           </a:blip>
           <a:srcRect/>
@@ -16157,441 +16253,6 @@
                 <a:sym typeface="Urbanist"/>
               </a:rPr>
               <a:t>en.wikipedia.org</a:t>
-            </a:r>
-            <a:endParaRPr/>
-          </a:p>
-        </p:txBody>
-      </p:sp>
-      <p:pic>
-        <p:nvPicPr>
-          <p:cNvPr id="222" name="Google Shape;222;p21" descr="image.png"/>
-          <p:cNvPicPr preferRelativeResize="0"/>
-          <p:nvPr/>
-        </p:nvPicPr>
-        <p:blipFill rotWithShape="1">
-          <a:blip r:embed="rId7">
-            <a:alphaModFix/>
-          </a:blip>
-          <a:srcRect/>
-          <a:stretch/>
-        </p:blipFill>
-        <p:spPr>
-          <a:xfrm>
-            <a:off x="571500" y="3758505"/>
-            <a:ext cx="857250" cy="476250"/>
-          </a:xfrm>
-          <a:prstGeom prst="rect">
-            <a:avLst/>
-          </a:prstGeom>
-          <a:noFill/>
-          <a:ln>
-            <a:noFill/>
-          </a:ln>
-        </p:spPr>
-      </p:pic>
-      <p:sp>
-        <p:nvSpPr>
-          <p:cNvPr id="223" name="Google Shape;223;p21"/>
-          <p:cNvSpPr txBox="1"/>
-          <p:nvPr/>
-        </p:nvSpPr>
-        <p:spPr>
-          <a:xfrm>
-            <a:off x="1666875" y="3751957"/>
-            <a:ext cx="9953625" cy="198090"/>
-          </a:xfrm>
-          <a:prstGeom prst="rect">
-            <a:avLst/>
-          </a:prstGeom>
-          <a:noFill/>
-          <a:ln>
-            <a:noFill/>
-          </a:ln>
-        </p:spPr>
-        <p:txBody>
-          <a:bodyPr spcFirstLastPara="1" wrap="square" lIns="0" tIns="0" rIns="0" bIns="0" anchor="t" anchorCtr="0">
-            <a:spAutoFit/>
-          </a:bodyPr>
-          <a:lstStyle/>
-          <a:p>
-            <a:pPr marL="0" marR="0" lvl="0" indent="0" algn="l" rtl="0">
-              <a:lnSpc>
-                <a:spcPct val="160000"/>
-              </a:lnSpc>
-              <a:spcBef>
-                <a:spcPts val="0"/>
-              </a:spcBef>
-              <a:spcAft>
-                <a:spcPts val="0"/>
-              </a:spcAft>
-              <a:buNone/>
-            </a:pPr>
-            <a:r>
-              <a:rPr lang="en-US" sz="975" b="0" i="0" u="none" strike="noStrike" cap="none">
-                <a:solidFill>
-                  <a:srgbClr val="CBD5E1"/>
-                </a:solidFill>
-                <a:latin typeface="Urbanist"/>
-                <a:ea typeface="Urbanist"/>
-                <a:cs typeface="Urbanist"/>
-                <a:sym typeface="Urbanist"/>
-              </a:rPr>
-              <a:t>https://cagrimmett.com/img/word_frequency_barchart.png</a:t>
-            </a:r>
-            <a:endParaRPr/>
-          </a:p>
-        </p:txBody>
-      </p:sp>
-      <p:sp>
-        <p:nvSpPr>
-          <p:cNvPr id="224" name="Google Shape;224;p21"/>
-          <p:cNvSpPr txBox="1"/>
-          <p:nvPr/>
-        </p:nvSpPr>
-        <p:spPr>
-          <a:xfrm>
-            <a:off x="1666875" y="3997672"/>
-            <a:ext cx="9953625" cy="243780"/>
-          </a:xfrm>
-          <a:prstGeom prst="rect">
-            <a:avLst/>
-          </a:prstGeom>
-          <a:noFill/>
-          <a:ln>
-            <a:noFill/>
-          </a:ln>
-        </p:spPr>
-        <p:txBody>
-          <a:bodyPr spcFirstLastPara="1" wrap="square" lIns="0" tIns="0" rIns="0" bIns="0" anchor="t" anchorCtr="0">
-            <a:spAutoFit/>
-          </a:bodyPr>
-          <a:lstStyle/>
-          <a:p>
-            <a:pPr marL="0" marR="0" lvl="0" indent="0" algn="l" rtl="0">
-              <a:lnSpc>
-                <a:spcPct val="160000"/>
-              </a:lnSpc>
-              <a:spcBef>
-                <a:spcPts val="0"/>
-              </a:spcBef>
-              <a:spcAft>
-                <a:spcPts val="0"/>
-              </a:spcAft>
-              <a:buNone/>
-            </a:pPr>
-            <a:r>
-              <a:rPr lang="en-US" sz="1200" b="0" i="0" u="none" strike="noStrike" cap="none">
-                <a:solidFill>
-                  <a:srgbClr val="CBD5E1"/>
-                </a:solidFill>
-                <a:latin typeface="Urbanist"/>
-                <a:ea typeface="Urbanist"/>
-                <a:cs typeface="Urbanist"/>
-                <a:sym typeface="Urbanist"/>
-              </a:rPr>
-              <a:t>Source: </a:t>
-            </a:r>
-            <a:r>
-              <a:rPr lang="en-US" sz="1200" b="0" i="0" u="none" strike="noStrike" cap="none">
-                <a:solidFill>
-                  <a:srgbClr val="4F46E5"/>
-                </a:solidFill>
-                <a:latin typeface="Urbanist"/>
-                <a:ea typeface="Urbanist"/>
-                <a:cs typeface="Urbanist"/>
-                <a:sym typeface="Urbanist"/>
-              </a:rPr>
-              <a:t>cagrimmett.com</a:t>
-            </a:r>
-            <a:endParaRPr/>
-          </a:p>
-        </p:txBody>
-      </p:sp>
-      <p:pic>
-        <p:nvPicPr>
-          <p:cNvPr id="225" name="Google Shape;225;p21" descr="image.png"/>
-          <p:cNvPicPr preferRelativeResize="0"/>
-          <p:nvPr/>
-        </p:nvPicPr>
-        <p:blipFill rotWithShape="1">
-          <a:blip r:embed="rId8">
-            <a:alphaModFix/>
-          </a:blip>
-          <a:srcRect/>
-          <a:stretch/>
-        </p:blipFill>
-        <p:spPr>
-          <a:xfrm>
-            <a:off x="571500" y="4642395"/>
-            <a:ext cx="857250" cy="476250"/>
-          </a:xfrm>
-          <a:prstGeom prst="rect">
-            <a:avLst/>
-          </a:prstGeom>
-          <a:noFill/>
-          <a:ln>
-            <a:noFill/>
-          </a:ln>
-        </p:spPr>
-      </p:pic>
-      <p:sp>
-        <p:nvSpPr>
-          <p:cNvPr id="226" name="Google Shape;226;p21"/>
-          <p:cNvSpPr txBox="1"/>
-          <p:nvPr/>
-        </p:nvSpPr>
-        <p:spPr>
-          <a:xfrm>
-            <a:off x="1666875" y="4536727"/>
-            <a:ext cx="9953625" cy="396180"/>
-          </a:xfrm>
-          <a:prstGeom prst="rect">
-            <a:avLst/>
-          </a:prstGeom>
-          <a:noFill/>
-          <a:ln>
-            <a:noFill/>
-          </a:ln>
-        </p:spPr>
-        <p:txBody>
-          <a:bodyPr spcFirstLastPara="1" wrap="square" lIns="0" tIns="0" rIns="0" bIns="0" anchor="t" anchorCtr="0">
-            <a:spAutoFit/>
-          </a:bodyPr>
-          <a:lstStyle/>
-          <a:p>
-            <a:pPr marL="0" marR="0" lvl="0" indent="0" algn="l" rtl="0">
-              <a:lnSpc>
-                <a:spcPct val="160000"/>
-              </a:lnSpc>
-              <a:spcBef>
-                <a:spcPts val="0"/>
-              </a:spcBef>
-              <a:spcAft>
-                <a:spcPts val="0"/>
-              </a:spcAft>
-              <a:buNone/>
-            </a:pPr>
-            <a:r>
-              <a:rPr lang="en-US" sz="975" b="0" i="0" u="none" strike="noStrike" cap="none">
-                <a:solidFill>
-                  <a:srgbClr val="CBD5E1"/>
-                </a:solidFill>
-                <a:latin typeface="Urbanist"/>
-                <a:ea typeface="Urbanist"/>
-                <a:cs typeface="Urbanist"/>
-                <a:sym typeface="Urbanist"/>
-              </a:rPr>
-              <a:t>https://static.vecteezy.com/system/resources/previews/056/167/702/non_2x/table-alarm-clock-pointing-at-9pm-or-9am-with-customizable-space-for-text-time-management-concept-and-copy-space-photo.jpg</a:t>
-            </a:r>
-            <a:endParaRPr/>
-          </a:p>
-        </p:txBody>
-      </p:sp>
-      <p:sp>
-        <p:nvSpPr>
-          <p:cNvPr id="227" name="Google Shape;227;p21"/>
-          <p:cNvSpPr txBox="1"/>
-          <p:nvPr/>
-        </p:nvSpPr>
-        <p:spPr>
-          <a:xfrm>
-            <a:off x="1666875" y="4980533"/>
-            <a:ext cx="9953625" cy="243780"/>
-          </a:xfrm>
-          <a:prstGeom prst="rect">
-            <a:avLst/>
-          </a:prstGeom>
-          <a:noFill/>
-          <a:ln>
-            <a:noFill/>
-          </a:ln>
-        </p:spPr>
-        <p:txBody>
-          <a:bodyPr spcFirstLastPara="1" wrap="square" lIns="0" tIns="0" rIns="0" bIns="0" anchor="t" anchorCtr="0">
-            <a:spAutoFit/>
-          </a:bodyPr>
-          <a:lstStyle/>
-          <a:p>
-            <a:pPr marL="0" marR="0" lvl="0" indent="0" algn="l" rtl="0">
-              <a:lnSpc>
-                <a:spcPct val="160000"/>
-              </a:lnSpc>
-              <a:spcBef>
-                <a:spcPts val="0"/>
-              </a:spcBef>
-              <a:spcAft>
-                <a:spcPts val="0"/>
-              </a:spcAft>
-              <a:buNone/>
-            </a:pPr>
-            <a:r>
-              <a:rPr lang="en-US" sz="1200" b="0" i="0" u="none" strike="noStrike" cap="none">
-                <a:solidFill>
-                  <a:srgbClr val="CBD5E1"/>
-                </a:solidFill>
-                <a:latin typeface="Urbanist"/>
-                <a:ea typeface="Urbanist"/>
-                <a:cs typeface="Urbanist"/>
-                <a:sym typeface="Urbanist"/>
-              </a:rPr>
-              <a:t>Source: </a:t>
-            </a:r>
-            <a:r>
-              <a:rPr lang="en-US" sz="1200" b="0" i="0" u="none" strike="noStrike" cap="none">
-                <a:solidFill>
-                  <a:srgbClr val="4F46E5"/>
-                </a:solidFill>
-                <a:latin typeface="Urbanist"/>
-                <a:ea typeface="Urbanist"/>
-                <a:cs typeface="Urbanist"/>
-                <a:sym typeface="Urbanist"/>
-              </a:rPr>
-              <a:t>www.vecteezy.com</a:t>
-            </a:r>
-            <a:endParaRPr/>
-          </a:p>
-        </p:txBody>
-      </p:sp>
-      <p:pic>
-        <p:nvPicPr>
-          <p:cNvPr id="228" name="Google Shape;228;p21" descr="image.png"/>
-          <p:cNvPicPr preferRelativeResize="0"/>
-          <p:nvPr/>
-        </p:nvPicPr>
-        <p:blipFill rotWithShape="1">
-          <a:blip r:embed="rId9">
-            <a:alphaModFix/>
-          </a:blip>
-          <a:srcRect/>
-          <a:stretch/>
-        </p:blipFill>
-        <p:spPr>
-          <a:xfrm>
-            <a:off x="571500" y="5526137"/>
-            <a:ext cx="857250" cy="476250"/>
-          </a:xfrm>
-          <a:prstGeom prst="rect">
-            <a:avLst/>
-          </a:prstGeom>
-          <a:noFill/>
-          <a:ln>
-            <a:noFill/>
-          </a:ln>
-        </p:spPr>
-      </p:pic>
-      <p:sp>
-        <p:nvSpPr>
-          <p:cNvPr id="229" name="Google Shape;229;p21"/>
-          <p:cNvSpPr txBox="1"/>
-          <p:nvPr/>
-        </p:nvSpPr>
-        <p:spPr>
-          <a:xfrm>
-            <a:off x="1666875" y="5519588"/>
-            <a:ext cx="9953625" cy="198090"/>
-          </a:xfrm>
-          <a:prstGeom prst="rect">
-            <a:avLst/>
-          </a:prstGeom>
-          <a:noFill/>
-          <a:ln>
-            <a:noFill/>
-          </a:ln>
-        </p:spPr>
-        <p:txBody>
-          <a:bodyPr spcFirstLastPara="1" wrap="square" lIns="0" tIns="0" rIns="0" bIns="0" anchor="t" anchorCtr="0">
-            <a:spAutoFit/>
-          </a:bodyPr>
-          <a:lstStyle/>
-          <a:p>
-            <a:pPr marL="0" marR="0" lvl="0" indent="0" algn="l" rtl="0">
-              <a:lnSpc>
-                <a:spcPct val="160000"/>
-              </a:lnSpc>
-              <a:spcBef>
-                <a:spcPts val="0"/>
-              </a:spcBef>
-              <a:spcAft>
-                <a:spcPts val="0"/>
-              </a:spcAft>
-              <a:buNone/>
-            </a:pPr>
-            <a:r>
-              <a:rPr lang="en-US" sz="975" b="0" i="0" u="none" strike="noStrike" cap="none">
-                <a:solidFill>
-                  <a:srgbClr val="CBD5E1"/>
-                </a:solidFill>
-                <a:latin typeface="Urbanist"/>
-                <a:ea typeface="Urbanist"/>
-                <a:cs typeface="Urbanist"/>
-                <a:sym typeface="Urbanist"/>
-              </a:rPr>
-              <a:t>https://cdn.dribbble.com/userupload/44075575/file/original-c347f3abbb947b6bf51671f43f83f8c7.webp?resize=752x&amp;vertical=center</a:t>
-            </a:r>
-            <a:endParaRPr/>
-          </a:p>
-        </p:txBody>
-      </p:sp>
-      <p:sp>
-        <p:nvSpPr>
-          <p:cNvPr id="230" name="Google Shape;230;p21"/>
-          <p:cNvSpPr txBox="1"/>
-          <p:nvPr/>
-        </p:nvSpPr>
-        <p:spPr>
-          <a:xfrm>
-            <a:off x="1666875" y="5765303"/>
-            <a:ext cx="9953625" cy="243780"/>
-          </a:xfrm>
-          <a:prstGeom prst="rect">
-            <a:avLst/>
-          </a:prstGeom>
-          <a:noFill/>
-          <a:ln>
-            <a:noFill/>
-          </a:ln>
-        </p:spPr>
-        <p:txBody>
-          <a:bodyPr spcFirstLastPara="1" wrap="square" lIns="0" tIns="0" rIns="0" bIns="0" anchor="t" anchorCtr="0">
-            <a:spAutoFit/>
-          </a:bodyPr>
-          <a:lstStyle/>
-          <a:p>
-            <a:pPr marL="0" marR="0" lvl="0" indent="0" algn="l" rtl="0">
-              <a:lnSpc>
-                <a:spcPct val="160000"/>
-              </a:lnSpc>
-              <a:spcBef>
-                <a:spcPts val="0"/>
-              </a:spcBef>
-              <a:spcAft>
-                <a:spcPts val="0"/>
-              </a:spcAft>
-              <a:buNone/>
-            </a:pPr>
-            <a:r>
-              <a:rPr lang="en-US" sz="1200" b="0" i="0" u="none" strike="noStrike" cap="none">
-                <a:solidFill>
-                  <a:srgbClr val="CBD5E1"/>
-                </a:solidFill>
-                <a:latin typeface="Urbanist"/>
-                <a:ea typeface="Urbanist"/>
-                <a:cs typeface="Urbanist"/>
-                <a:sym typeface="Urbanist"/>
-              </a:rPr>
-              <a:t>Source: </a:t>
-            </a:r>
-            <a:r>
-              <a:rPr lang="en-US" sz="1200" b="0" i="0" u="none" strike="noStrike" cap="none">
-                <a:solidFill>
-                  <a:srgbClr val="4F46E5"/>
-                </a:solidFill>
-                <a:latin typeface="Urbanist"/>
-                <a:ea typeface="Urbanist"/>
-                <a:cs typeface="Urbanist"/>
-                <a:sym typeface="Urbanist"/>
-              </a:rPr>
-              <a:t>dribbble.com</a:t>
             </a:r>
             <a:endParaRPr/>
           </a:p>

</xml_diff>